<commit_message>
Update documentation to reflect latest changes in specified components
</commit_message>
<xml_diff>
--- a/documentation/doxygen/src/images/blocks.pptx
+++ b/documentation/doxygen/src/images/blocks.pptx
@@ -273,7 +273,7 @@
           <a:p>
             <a:fld id="{E1BCA6AF-7F69-456D-BB79-EC94A44BF887}" type="datetimeFigureOut">
               <a:rPr lang="en-US" smtClean="0"/>
-              <a:t>5/10/2023</a:t>
+              <a:t>11/10/2023</a:t>
             </a:fld>
             <a:endParaRPr lang="en-US"/>
           </a:p>
@@ -471,7 +471,7 @@
           <a:p>
             <a:fld id="{E1BCA6AF-7F69-456D-BB79-EC94A44BF887}" type="datetimeFigureOut">
               <a:rPr lang="en-US" smtClean="0"/>
-              <a:t>5/10/2023</a:t>
+              <a:t>11/10/2023</a:t>
             </a:fld>
             <a:endParaRPr lang="en-US"/>
           </a:p>
@@ -679,7 +679,7 @@
           <a:p>
             <a:fld id="{E1BCA6AF-7F69-456D-BB79-EC94A44BF887}" type="datetimeFigureOut">
               <a:rPr lang="en-US" smtClean="0"/>
-              <a:t>5/10/2023</a:t>
+              <a:t>11/10/2023</a:t>
             </a:fld>
             <a:endParaRPr lang="en-US"/>
           </a:p>
@@ -877,7 +877,7 @@
           <a:p>
             <a:fld id="{E1BCA6AF-7F69-456D-BB79-EC94A44BF887}" type="datetimeFigureOut">
               <a:rPr lang="en-US" smtClean="0"/>
-              <a:t>5/10/2023</a:t>
+              <a:t>11/10/2023</a:t>
             </a:fld>
             <a:endParaRPr lang="en-US"/>
           </a:p>
@@ -1152,7 +1152,7 @@
           <a:p>
             <a:fld id="{E1BCA6AF-7F69-456D-BB79-EC94A44BF887}" type="datetimeFigureOut">
               <a:rPr lang="en-US" smtClean="0"/>
-              <a:t>5/10/2023</a:t>
+              <a:t>11/10/2023</a:t>
             </a:fld>
             <a:endParaRPr lang="en-US"/>
           </a:p>
@@ -1417,7 +1417,7 @@
           <a:p>
             <a:fld id="{E1BCA6AF-7F69-456D-BB79-EC94A44BF887}" type="datetimeFigureOut">
               <a:rPr lang="en-US" smtClean="0"/>
-              <a:t>5/10/2023</a:t>
+              <a:t>11/10/2023</a:t>
             </a:fld>
             <a:endParaRPr lang="en-US"/>
           </a:p>
@@ -1829,7 +1829,7 @@
           <a:p>
             <a:fld id="{E1BCA6AF-7F69-456D-BB79-EC94A44BF887}" type="datetimeFigureOut">
               <a:rPr lang="en-US" smtClean="0"/>
-              <a:t>5/10/2023</a:t>
+              <a:t>11/10/2023</a:t>
             </a:fld>
             <a:endParaRPr lang="en-US"/>
           </a:p>
@@ -1970,7 +1970,7 @@
           <a:p>
             <a:fld id="{E1BCA6AF-7F69-456D-BB79-EC94A44BF887}" type="datetimeFigureOut">
               <a:rPr lang="en-US" smtClean="0"/>
-              <a:t>5/10/2023</a:t>
+              <a:t>11/10/2023</a:t>
             </a:fld>
             <a:endParaRPr lang="en-US"/>
           </a:p>
@@ -2083,7 +2083,7 @@
           <a:p>
             <a:fld id="{E1BCA6AF-7F69-456D-BB79-EC94A44BF887}" type="datetimeFigureOut">
               <a:rPr lang="en-US" smtClean="0"/>
-              <a:t>5/10/2023</a:t>
+              <a:t>11/10/2023</a:t>
             </a:fld>
             <a:endParaRPr lang="en-US"/>
           </a:p>
@@ -2394,7 +2394,7 @@
           <a:p>
             <a:fld id="{E1BCA6AF-7F69-456D-BB79-EC94A44BF887}" type="datetimeFigureOut">
               <a:rPr lang="en-US" smtClean="0"/>
-              <a:t>5/10/2023</a:t>
+              <a:t>11/10/2023</a:t>
             </a:fld>
             <a:endParaRPr lang="en-US"/>
           </a:p>
@@ -2682,7 +2682,7 @@
           <a:p>
             <a:fld id="{E1BCA6AF-7F69-456D-BB79-EC94A44BF887}" type="datetimeFigureOut">
               <a:rPr lang="en-US" smtClean="0"/>
-              <a:t>5/10/2023</a:t>
+              <a:t>11/10/2023</a:t>
             </a:fld>
             <a:endParaRPr lang="en-US"/>
           </a:p>
@@ -2923,7 +2923,7 @@
           <a:p>
             <a:fld id="{E1BCA6AF-7F69-456D-BB79-EC94A44BF887}" type="datetimeFigureOut">
               <a:rPr lang="en-US" smtClean="0"/>
-              <a:t>5/10/2023</a:t>
+              <a:t>11/10/2023</a:t>
             </a:fld>
             <a:endParaRPr lang="en-US"/>
           </a:p>
@@ -3342,10 +3342,10 @@
       </p:grpSpPr>
       <p:sp>
         <p:nvSpPr>
-          <p:cNvPr id="22" name="Rectangle 21">
-            <a:extLst>
-              <a:ext uri="{FF2B5EF4-FFF2-40B4-BE49-F238E27FC236}">
-                <a16:creationId xmlns:a16="http://schemas.microsoft.com/office/drawing/2014/main" id="{6ACD23E5-9F77-BE44-84DB-9F32EFC5D735}"/>
+          <p:cNvPr id="6" name="Rectangle 5">
+            <a:extLst>
+              <a:ext uri="{FF2B5EF4-FFF2-40B4-BE49-F238E27FC236}">
+                <a16:creationId xmlns:a16="http://schemas.microsoft.com/office/drawing/2014/main" id="{59D80D6B-2597-378A-D104-F3DABE4644E4}"/>
               </a:ext>
             </a:extLst>
           </p:cNvPr>
@@ -3354,8 +3354,60 @@
         </p:nvSpPr>
         <p:spPr>
           <a:xfrm>
-            <a:off x="444138" y="592183"/>
-            <a:ext cx="6792686" cy="2483628"/>
+            <a:off x="444136" y="592183"/>
+            <a:ext cx="11362959" cy="4319442"/>
+          </a:xfrm>
+          <a:prstGeom prst="rect">
+            <a:avLst/>
+          </a:prstGeom>
+          <a:solidFill>
+            <a:schemeClr val="bg1"/>
+          </a:solidFill>
+          <a:ln>
+            <a:noFill/>
+          </a:ln>
+        </p:spPr>
+        <p:style>
+          <a:lnRef idx="2">
+            <a:schemeClr val="accent1">
+              <a:shade val="50000"/>
+            </a:schemeClr>
+          </a:lnRef>
+          <a:fillRef idx="1">
+            <a:schemeClr val="accent1"/>
+          </a:fillRef>
+          <a:effectRef idx="0">
+            <a:schemeClr val="accent1"/>
+          </a:effectRef>
+          <a:fontRef idx="minor">
+            <a:schemeClr val="lt1"/>
+          </a:fontRef>
+        </p:style>
+        <p:txBody>
+          <a:bodyPr vert="vert270" rtlCol="0" anchor="t"/>
+          <a:lstStyle/>
+          <a:p>
+            <a:pPr algn="ctr"/>
+            <a:endParaRPr lang="en-US" dirty="0"/>
+          </a:p>
+        </p:txBody>
+      </p:sp>
+      <p:sp>
+        <p:nvSpPr>
+          <p:cNvPr id="22" name="Rectangle 21">
+            <a:extLst>
+              <a:ext uri="{FF2B5EF4-FFF2-40B4-BE49-F238E27FC236}">
+                <a16:creationId xmlns:a16="http://schemas.microsoft.com/office/drawing/2014/main" id="{6ACD23E5-9F77-BE44-84DB-9F32EFC5D735}"/>
+              </a:ext>
+            </a:extLst>
+          </p:cNvPr>
+          <p:cNvSpPr/>
+          <p:nvPr/>
+        </p:nvSpPr>
+        <p:spPr>
+          <a:xfrm>
+            <a:off x="444137" y="592183"/>
+            <a:ext cx="7941873" cy="2483628"/>
           </a:xfrm>
           <a:prstGeom prst="rect">
             <a:avLst/>
@@ -3410,8 +3462,8 @@
         </p:nvSpPr>
         <p:spPr>
           <a:xfrm>
-            <a:off x="444138" y="3293527"/>
-            <a:ext cx="6792686" cy="1618098"/>
+            <a:off x="444136" y="3293527"/>
+            <a:ext cx="7941873" cy="1618098"/>
           </a:xfrm>
           <a:prstGeom prst="rect">
             <a:avLst/>
@@ -3467,7 +3519,7 @@
         <p:spPr>
           <a:xfrm>
             <a:off x="1172094" y="748145"/>
-            <a:ext cx="5864431" cy="900000"/>
+            <a:ext cx="7051496" cy="900000"/>
           </a:xfrm>
           <a:prstGeom prst="rect">
             <a:avLst/>
@@ -3544,8 +3596,8 @@
         </p:nvSpPr>
         <p:spPr>
           <a:xfrm>
-            <a:off x="1172095" y="1976870"/>
-            <a:ext cx="3600000" cy="900000"/>
+            <a:off x="1172094" y="1976870"/>
+            <a:ext cx="4768335" cy="900000"/>
           </a:xfrm>
           <a:prstGeom prst="rect">
             <a:avLst/>
@@ -3602,8 +3654,8 @@
         </p:nvCxnSpPr>
         <p:spPr>
           <a:xfrm>
-            <a:off x="2972095" y="1648145"/>
-            <a:ext cx="0" cy="328725"/>
+            <a:off x="3556261" y="1647347"/>
+            <a:ext cx="1" cy="329523"/>
           </a:xfrm>
           <a:prstGeom prst="straightConnector1">
             <a:avLst/>
@@ -3688,8 +3740,8 @@
         </p:nvSpPr>
         <p:spPr>
           <a:xfrm>
-            <a:off x="7676715" y="1362506"/>
-            <a:ext cx="3012964" cy="900000"/>
+            <a:off x="8863779" y="1362506"/>
+            <a:ext cx="2943317" cy="900000"/>
           </a:xfrm>
           <a:prstGeom prst="rect">
             <a:avLst/>
@@ -3749,7 +3801,7 @@
         </p:nvSpPr>
         <p:spPr>
           <a:xfrm>
-            <a:off x="5012572" y="3472361"/>
+            <a:off x="6193537" y="3470002"/>
             <a:ext cx="1888077" cy="1221548"/>
           </a:xfrm>
           <a:prstGeom prst="rect">
@@ -3805,7 +3857,7 @@
         </p:nvSpPr>
         <p:spPr>
           <a:xfrm>
-            <a:off x="4868881" y="1980062"/>
+            <a:off x="6055945" y="1980062"/>
             <a:ext cx="2167645" cy="900000"/>
           </a:xfrm>
           <a:prstGeom prst="rect">
@@ -3869,7 +3921,7 @@
         </p:nvCxnSpPr>
         <p:spPr>
           <a:xfrm>
-            <a:off x="3706339" y="2876870"/>
+            <a:off x="5288491" y="2878613"/>
             <a:ext cx="0" cy="595492"/>
           </a:xfrm>
           <a:prstGeom prst="straightConnector1">
@@ -3914,9 +3966,9 @@
           <p:nvPr/>
         </p:nvCxnSpPr>
         <p:spPr>
-          <a:xfrm>
-            <a:off x="5952704" y="2880062"/>
-            <a:ext cx="3907" cy="592299"/>
+          <a:xfrm flipH="1">
+            <a:off x="7137576" y="2880062"/>
+            <a:ext cx="2192" cy="589940"/>
           </a:xfrm>
           <a:prstGeom prst="straightConnector1">
             <a:avLst/>
@@ -3960,7 +4012,7 @@
         </p:nvCxnSpPr>
         <p:spPr>
           <a:xfrm>
-            <a:off x="5952704" y="1648145"/>
+            <a:off x="7139768" y="1648145"/>
             <a:ext cx="0" cy="331917"/>
           </a:xfrm>
           <a:prstGeom prst="straightConnector1">
@@ -4002,7 +4054,7 @@
         </p:nvSpPr>
         <p:spPr>
           <a:xfrm>
-            <a:off x="7679036" y="3633135"/>
+            <a:off x="8863695" y="3606270"/>
             <a:ext cx="2250375" cy="900000"/>
           </a:xfrm>
           <a:prstGeom prst="rect">
@@ -4063,7 +4115,7 @@
         </p:nvSpPr>
         <p:spPr>
           <a:xfrm>
-            <a:off x="7314459" y="748144"/>
+            <a:off x="8501523" y="748144"/>
             <a:ext cx="362172" cy="2128725"/>
           </a:xfrm>
           <a:prstGeom prst="rightBrace">
@@ -4268,8 +4320,8 @@
         </p:nvSpPr>
         <p:spPr>
           <a:xfrm>
-            <a:off x="1172094" y="3472361"/>
-            <a:ext cx="3478282" cy="1221548"/>
+            <a:off x="1221204" y="3472361"/>
+            <a:ext cx="4719225" cy="1221548"/>
           </a:xfrm>
           <a:prstGeom prst="rect">
             <a:avLst/>
@@ -4320,8 +4372,8 @@
         </p:nvSpPr>
         <p:spPr>
           <a:xfrm>
-            <a:off x="1324945" y="3606270"/>
-            <a:ext cx="1437353" cy="938725"/>
+            <a:off x="1324946" y="3606270"/>
+            <a:ext cx="1144078" cy="938725"/>
           </a:xfrm>
           <a:prstGeom prst="rect">
             <a:avLst/>
@@ -4363,10 +4415,10 @@
       </p:sp>
       <p:sp>
         <p:nvSpPr>
-          <p:cNvPr id="12" name="Rectangle 11">
-            <a:extLst>
-              <a:ext uri="{FF2B5EF4-FFF2-40B4-BE49-F238E27FC236}">
-                <a16:creationId xmlns:a16="http://schemas.microsoft.com/office/drawing/2014/main" id="{A21F38A5-4A7C-382B-B245-C6BD6FEE7158}"/>
+          <p:cNvPr id="16" name="Rectangle 15">
+            <a:extLst>
+              <a:ext uri="{FF2B5EF4-FFF2-40B4-BE49-F238E27FC236}">
+                <a16:creationId xmlns:a16="http://schemas.microsoft.com/office/drawing/2014/main" id="{BFD001A7-7987-3E47-D9FF-E1D262C3E8F7}"/>
               </a:ext>
             </a:extLst>
           </p:cNvPr>
@@ -4375,8 +4427,8 @@
         </p:nvSpPr>
         <p:spPr>
           <a:xfrm>
-            <a:off x="2911235" y="3600313"/>
-            <a:ext cx="1615439" cy="938725"/>
+            <a:off x="3638374" y="3606270"/>
+            <a:ext cx="1059468" cy="938725"/>
           </a:xfrm>
           <a:prstGeom prst="rect">
             <a:avLst/>
@@ -4411,16 +4463,7 @@
             <a:pPr algn="ctr"/>
             <a:r>
               <a:rPr lang="en-US" sz="2000" dirty="0"/>
-              <a:t>I/O</a:t>
-            </a:r>
-            <a:br>
-              <a:rPr lang="en-US" sz="2000" dirty="0"/>
-            </a:br>
-            <a:r>
-              <a:rPr lang="en-US" sz="1050" dirty="0">
-                <a:latin typeface="Consolas" panose="020B0609020204030204" pitchFamily="49" charset="0"/>
-              </a:rPr>
-              <a:t>STDERR,STDIN,STDOUT</a:t>
+              <a:t>STDOUT</a:t>
             </a:r>
             <a:endParaRPr lang="en-US" sz="1200" dirty="0">
               <a:latin typeface="Consolas" panose="020B0609020204030204" pitchFamily="49" charset="0"/>
@@ -4428,6 +4471,210 @@
           </a:p>
         </p:txBody>
       </p:sp>
+      <p:sp>
+        <p:nvSpPr>
+          <p:cNvPr id="17" name="Rectangle 16">
+            <a:extLst>
+              <a:ext uri="{FF2B5EF4-FFF2-40B4-BE49-F238E27FC236}">
+                <a16:creationId xmlns:a16="http://schemas.microsoft.com/office/drawing/2014/main" id="{CB817C28-F4C7-F551-69C2-04F57D8D7611}"/>
+              </a:ext>
+            </a:extLst>
+          </p:cNvPr>
+          <p:cNvSpPr/>
+          <p:nvPr/>
+        </p:nvSpPr>
+        <p:spPr>
+          <a:xfrm>
+            <a:off x="2522118" y="3606270"/>
+            <a:ext cx="1059468" cy="938725"/>
+          </a:xfrm>
+          <a:prstGeom prst="rect">
+            <a:avLst/>
+          </a:prstGeom>
+          <a:solidFill>
+            <a:schemeClr val="tx2"/>
+          </a:solidFill>
+          <a:ln>
+            <a:noFill/>
+          </a:ln>
+        </p:spPr>
+        <p:style>
+          <a:lnRef idx="2">
+            <a:schemeClr val="accent1">
+              <a:shade val="50000"/>
+            </a:schemeClr>
+          </a:lnRef>
+          <a:fillRef idx="1">
+            <a:schemeClr val="accent1"/>
+          </a:fillRef>
+          <a:effectRef idx="0">
+            <a:schemeClr val="accent1"/>
+          </a:effectRef>
+          <a:fontRef idx="minor">
+            <a:schemeClr val="lt1"/>
+          </a:fontRef>
+        </p:style>
+        <p:txBody>
+          <a:bodyPr rtlCol="0" anchor="ctr"/>
+          <a:lstStyle/>
+          <a:p>
+            <a:pPr algn="ctr"/>
+            <a:r>
+              <a:rPr lang="en-US" sz="2000" dirty="0"/>
+              <a:t>STDIN</a:t>
+            </a:r>
+            <a:endParaRPr lang="en-US" sz="1200" dirty="0">
+              <a:latin typeface="Consolas" panose="020B0609020204030204" pitchFamily="49" charset="0"/>
+            </a:endParaRPr>
+          </a:p>
+        </p:txBody>
+      </p:sp>
+      <p:sp>
+        <p:nvSpPr>
+          <p:cNvPr id="23" name="Rectangle 22">
+            <a:extLst>
+              <a:ext uri="{FF2B5EF4-FFF2-40B4-BE49-F238E27FC236}">
+                <a16:creationId xmlns:a16="http://schemas.microsoft.com/office/drawing/2014/main" id="{7EE09DA7-C287-16D7-2850-AB3F34797EE3}"/>
+              </a:ext>
+            </a:extLst>
+          </p:cNvPr>
+          <p:cNvSpPr/>
+          <p:nvPr/>
+        </p:nvSpPr>
+        <p:spPr>
+          <a:xfrm>
+            <a:off x="4754630" y="3606270"/>
+            <a:ext cx="1059468" cy="938725"/>
+          </a:xfrm>
+          <a:prstGeom prst="rect">
+            <a:avLst/>
+          </a:prstGeom>
+          <a:solidFill>
+            <a:schemeClr val="tx2"/>
+          </a:solidFill>
+          <a:ln>
+            <a:noFill/>
+          </a:ln>
+        </p:spPr>
+        <p:style>
+          <a:lnRef idx="2">
+            <a:schemeClr val="accent1">
+              <a:shade val="50000"/>
+            </a:schemeClr>
+          </a:lnRef>
+          <a:fillRef idx="1">
+            <a:schemeClr val="accent1"/>
+          </a:fillRef>
+          <a:effectRef idx="0">
+            <a:schemeClr val="accent1"/>
+          </a:effectRef>
+          <a:fontRef idx="minor">
+            <a:schemeClr val="lt1"/>
+          </a:fontRef>
+        </p:style>
+        <p:txBody>
+          <a:bodyPr rtlCol="0" anchor="ctr"/>
+          <a:lstStyle/>
+          <a:p>
+            <a:pPr algn="ctr"/>
+            <a:r>
+              <a:rPr lang="en-US" sz="2000" dirty="0"/>
+              <a:t>STDERR</a:t>
+            </a:r>
+            <a:endParaRPr lang="en-US" sz="1200" dirty="0">
+              <a:latin typeface="Consolas" panose="020B0609020204030204" pitchFamily="49" charset="0"/>
+            </a:endParaRPr>
+          </a:p>
+        </p:txBody>
+      </p:sp>
+      <p:cxnSp>
+        <p:nvCxnSpPr>
+          <p:cNvPr id="28" name="Straight Arrow Connector 27">
+            <a:extLst>
+              <a:ext uri="{FF2B5EF4-FFF2-40B4-BE49-F238E27FC236}">
+                <a16:creationId xmlns:a16="http://schemas.microsoft.com/office/drawing/2014/main" id="{5EF2CFC3-06A5-BD51-0C2E-E06527EF1BEA}"/>
+              </a:ext>
+            </a:extLst>
+          </p:cNvPr>
+          <p:cNvCxnSpPr>
+            <a:cxnSpLocks/>
+          </p:cNvCxnSpPr>
+          <p:nvPr/>
+        </p:nvCxnSpPr>
+        <p:spPr>
+          <a:xfrm>
+            <a:off x="4189607" y="2876869"/>
+            <a:ext cx="0" cy="595492"/>
+          </a:xfrm>
+          <a:prstGeom prst="straightConnector1">
+            <a:avLst/>
+          </a:prstGeom>
+          <a:ln w="76200">
+            <a:solidFill>
+              <a:srgbClr val="002B49"/>
+            </a:solidFill>
+            <a:tailEnd type="triangle"/>
+          </a:ln>
+        </p:spPr>
+        <p:style>
+          <a:lnRef idx="1">
+            <a:schemeClr val="accent1"/>
+          </a:lnRef>
+          <a:fillRef idx="0">
+            <a:schemeClr val="accent1"/>
+          </a:fillRef>
+          <a:effectRef idx="0">
+            <a:schemeClr val="accent1"/>
+          </a:effectRef>
+          <a:fontRef idx="minor">
+            <a:schemeClr val="tx1"/>
+          </a:fontRef>
+        </p:style>
+      </p:cxnSp>
+      <p:cxnSp>
+        <p:nvCxnSpPr>
+          <p:cNvPr id="29" name="Straight Arrow Connector 28">
+            <a:extLst>
+              <a:ext uri="{FF2B5EF4-FFF2-40B4-BE49-F238E27FC236}">
+                <a16:creationId xmlns:a16="http://schemas.microsoft.com/office/drawing/2014/main" id="{F67F1AC5-23CA-B40E-7D84-CC98405371FE}"/>
+              </a:ext>
+            </a:extLst>
+          </p:cNvPr>
+          <p:cNvCxnSpPr>
+            <a:cxnSpLocks/>
+          </p:cNvCxnSpPr>
+          <p:nvPr/>
+        </p:nvCxnSpPr>
+        <p:spPr>
+          <a:xfrm>
+            <a:off x="3054628" y="2874510"/>
+            <a:ext cx="0" cy="595492"/>
+          </a:xfrm>
+          <a:prstGeom prst="straightConnector1">
+            <a:avLst/>
+          </a:prstGeom>
+          <a:ln w="76200">
+            <a:solidFill>
+              <a:srgbClr val="002B49"/>
+            </a:solidFill>
+            <a:tailEnd type="triangle"/>
+          </a:ln>
+        </p:spPr>
+        <p:style>
+          <a:lnRef idx="1">
+            <a:schemeClr val="accent1"/>
+          </a:lnRef>
+          <a:fillRef idx="0">
+            <a:schemeClr val="accent1"/>
+          </a:fillRef>
+          <a:effectRef idx="0">
+            <a:schemeClr val="accent1"/>
+          </a:effectRef>
+          <a:fontRef idx="minor">
+            <a:schemeClr val="tx1"/>
+          </a:fontRef>
+        </p:style>
+      </p:cxnSp>
     </p:spTree>
     <p:extLst>
       <p:ext uri="{BB962C8B-B14F-4D97-AF65-F5344CB8AC3E}">
@@ -4473,7 +4720,7 @@
         <p:spPr>
           <a:xfrm>
             <a:off x="363273" y="3040185"/>
-            <a:ext cx="5732726" cy="3392962"/>
+            <a:ext cx="5732726" cy="3087565"/>
           </a:xfrm>
           <a:prstGeom prst="rect">
             <a:avLst/>
@@ -4585,7 +4832,7 @@
         <p:spPr>
           <a:xfrm>
             <a:off x="1091229" y="556557"/>
-            <a:ext cx="2903517" cy="900000"/>
+            <a:ext cx="3443756" cy="900000"/>
           </a:xfrm>
           <a:prstGeom prst="rect">
             <a:avLst/>
@@ -4653,7 +4900,7 @@
         <p:spPr>
           <a:xfrm>
             <a:off x="1091230" y="1785282"/>
-            <a:ext cx="2903516" cy="900000"/>
+            <a:ext cx="3443756" cy="900000"/>
           </a:xfrm>
           <a:prstGeom prst="rect">
             <a:avLst/>
@@ -4711,8 +4958,8 @@
         </p:nvCxnSpPr>
         <p:spPr>
           <a:xfrm>
-            <a:off x="2542988" y="1456557"/>
-            <a:ext cx="0" cy="328725"/>
+            <a:off x="2813107" y="1456557"/>
+            <a:ext cx="1" cy="328725"/>
           </a:xfrm>
           <a:prstGeom prst="straightConnector1">
             <a:avLst/>
@@ -4757,8 +5004,8 @@
         </p:nvCxnSpPr>
         <p:spPr>
           <a:xfrm flipH="1">
-            <a:off x="2541941" y="2685282"/>
-            <a:ext cx="1047" cy="552130"/>
+            <a:off x="2812317" y="2685282"/>
+            <a:ext cx="791" cy="552130"/>
           </a:xfrm>
           <a:prstGeom prst="straightConnector1">
             <a:avLst/>
@@ -4800,7 +5047,7 @@
         <p:spPr>
           <a:xfrm>
             <a:off x="1091229" y="3212948"/>
-            <a:ext cx="4846151" cy="3016152"/>
+            <a:ext cx="4846151" cy="2737002"/>
           </a:xfrm>
           <a:prstGeom prst="rect">
             <a:avLst/>
@@ -4839,10 +5086,10 @@
       </p:sp>
       <p:sp>
         <p:nvSpPr>
-          <p:cNvPr id="24" name="Rectangle 23">
-            <a:extLst>
-              <a:ext uri="{FF2B5EF4-FFF2-40B4-BE49-F238E27FC236}">
-                <a16:creationId xmlns:a16="http://schemas.microsoft.com/office/drawing/2014/main" id="{1CA2A669-77C3-9387-DB3B-2D8BE0E6734C}"/>
+          <p:cNvPr id="26" name="Diamond 25">
+            <a:extLst>
+              <a:ext uri="{FF2B5EF4-FFF2-40B4-BE49-F238E27FC236}">
+                <a16:creationId xmlns:a16="http://schemas.microsoft.com/office/drawing/2014/main" id="{4297B822-090C-34CA-C472-211BCA58A64D}"/>
               </a:ext>
             </a:extLst>
           </p:cNvPr>
@@ -4851,8 +5098,232 @@
         </p:nvSpPr>
         <p:spPr>
           <a:xfrm>
-            <a:off x="3830715" y="5134812"/>
-            <a:ext cx="1437353" cy="938725"/>
+            <a:off x="1728783" y="3237412"/>
+            <a:ext cx="2167067" cy="1381112"/>
+          </a:xfrm>
+          <a:prstGeom prst="diamond">
+            <a:avLst/>
+          </a:prstGeom>
+          <a:solidFill>
+            <a:schemeClr val="tx2"/>
+          </a:solidFill>
+          <a:ln>
+            <a:noFill/>
+          </a:ln>
+        </p:spPr>
+        <p:style>
+          <a:lnRef idx="2">
+            <a:schemeClr val="accent1">
+              <a:shade val="50000"/>
+            </a:schemeClr>
+          </a:lnRef>
+          <a:fillRef idx="1">
+            <a:schemeClr val="accent1"/>
+          </a:fillRef>
+          <a:effectRef idx="0">
+            <a:schemeClr val="accent1"/>
+          </a:effectRef>
+          <a:fontRef idx="minor">
+            <a:schemeClr val="lt1"/>
+          </a:fontRef>
+        </p:style>
+        <p:txBody>
+          <a:bodyPr rtlCol="0" anchor="ctr"/>
+          <a:lstStyle/>
+          <a:p>
+            <a:pPr algn="ctr"/>
+            <a:r>
+              <a:rPr lang="en-US" dirty="0"/>
+              <a:t>Standard stream ?</a:t>
+            </a:r>
+          </a:p>
+        </p:txBody>
+      </p:sp>
+      <p:cxnSp>
+        <p:nvCxnSpPr>
+          <p:cNvPr id="27" name="Straight Arrow Connector 26">
+            <a:extLst>
+              <a:ext uri="{FF2B5EF4-FFF2-40B4-BE49-F238E27FC236}">
+                <a16:creationId xmlns:a16="http://schemas.microsoft.com/office/drawing/2014/main" id="{43C8CF48-F0A9-6AF2-01DE-448F936D39D3}"/>
+              </a:ext>
+            </a:extLst>
+          </p:cNvPr>
+          <p:cNvCxnSpPr>
+            <a:cxnSpLocks/>
+            <a:stCxn id="26" idx="2"/>
+          </p:cNvCxnSpPr>
+          <p:nvPr/>
+        </p:nvCxnSpPr>
+        <p:spPr>
+          <a:xfrm>
+            <a:off x="2812317" y="4618524"/>
+            <a:ext cx="791" cy="516289"/>
+          </a:xfrm>
+          <a:prstGeom prst="straightConnector1">
+            <a:avLst/>
+          </a:prstGeom>
+          <a:ln w="76200">
+            <a:solidFill>
+              <a:schemeClr val="tx2"/>
+            </a:solidFill>
+            <a:tailEnd type="triangle"/>
+          </a:ln>
+        </p:spPr>
+        <p:style>
+          <a:lnRef idx="1">
+            <a:schemeClr val="accent1"/>
+          </a:lnRef>
+          <a:fillRef idx="0">
+            <a:schemeClr val="accent1"/>
+          </a:fillRef>
+          <a:effectRef idx="0">
+            <a:schemeClr val="accent1"/>
+          </a:effectRef>
+          <a:fontRef idx="minor">
+            <a:schemeClr val="tx1"/>
+          </a:fontRef>
+        </p:style>
+      </p:cxnSp>
+      <p:cxnSp>
+        <p:nvCxnSpPr>
+          <p:cNvPr id="28" name="Connector: Elbow 27">
+            <a:extLst>
+              <a:ext uri="{FF2B5EF4-FFF2-40B4-BE49-F238E27FC236}">
+                <a16:creationId xmlns:a16="http://schemas.microsoft.com/office/drawing/2014/main" id="{DEE2ABEA-D559-3DC2-A34F-BFD4C0342DA6}"/>
+              </a:ext>
+            </a:extLst>
+          </p:cNvPr>
+          <p:cNvCxnSpPr>
+            <a:cxnSpLocks/>
+            <a:stCxn id="26" idx="3"/>
+            <a:endCxn id="46" idx="0"/>
+          </p:cNvCxnSpPr>
+          <p:nvPr/>
+        </p:nvCxnSpPr>
+        <p:spPr>
+          <a:xfrm>
+            <a:off x="3895850" y="3927968"/>
+            <a:ext cx="1093092" cy="1206845"/>
+          </a:xfrm>
+          <a:prstGeom prst="bentConnector2">
+            <a:avLst/>
+          </a:prstGeom>
+          <a:ln w="76200">
+            <a:solidFill>
+              <a:schemeClr val="tx2"/>
+            </a:solidFill>
+            <a:tailEnd type="triangle"/>
+          </a:ln>
+        </p:spPr>
+        <p:style>
+          <a:lnRef idx="1">
+            <a:schemeClr val="accent1"/>
+          </a:lnRef>
+          <a:fillRef idx="0">
+            <a:schemeClr val="accent1"/>
+          </a:fillRef>
+          <a:effectRef idx="0">
+            <a:schemeClr val="accent1"/>
+          </a:effectRef>
+          <a:fontRef idx="minor">
+            <a:schemeClr val="tx1"/>
+          </a:fontRef>
+        </p:style>
+      </p:cxnSp>
+      <p:sp>
+        <p:nvSpPr>
+          <p:cNvPr id="29" name="TextBox 28">
+            <a:extLst>
+              <a:ext uri="{FF2B5EF4-FFF2-40B4-BE49-F238E27FC236}">
+                <a16:creationId xmlns:a16="http://schemas.microsoft.com/office/drawing/2014/main" id="{78E7C250-8779-610F-2B56-2FEC7391FF0B}"/>
+              </a:ext>
+            </a:extLst>
+          </p:cNvPr>
+          <p:cNvSpPr txBox="1"/>
+          <p:nvPr/>
+        </p:nvSpPr>
+        <p:spPr>
+          <a:xfrm>
+            <a:off x="2825244" y="4594150"/>
+            <a:ext cx="550507" cy="369332"/>
+          </a:xfrm>
+          <a:prstGeom prst="rect">
+            <a:avLst/>
+          </a:prstGeom>
+          <a:noFill/>
+        </p:spPr>
+        <p:txBody>
+          <a:bodyPr wrap="square" rtlCol="0">
+            <a:spAutoFit/>
+          </a:bodyPr>
+          <a:lstStyle/>
+          <a:p>
+            <a:r>
+              <a:rPr lang="en-US" dirty="0">
+                <a:solidFill>
+                  <a:schemeClr val="bg1"/>
+                </a:solidFill>
+              </a:rPr>
+              <a:t>Yes</a:t>
+            </a:r>
+          </a:p>
+        </p:txBody>
+      </p:sp>
+      <p:sp>
+        <p:nvSpPr>
+          <p:cNvPr id="30" name="TextBox 29">
+            <a:extLst>
+              <a:ext uri="{FF2B5EF4-FFF2-40B4-BE49-F238E27FC236}">
+                <a16:creationId xmlns:a16="http://schemas.microsoft.com/office/drawing/2014/main" id="{D0650F85-FD94-7FC8-3AA0-B287689DAFF6}"/>
+              </a:ext>
+            </a:extLst>
+          </p:cNvPr>
+          <p:cNvSpPr txBox="1"/>
+          <p:nvPr/>
+        </p:nvSpPr>
+        <p:spPr>
+          <a:xfrm>
+            <a:off x="3808377" y="3558636"/>
+            <a:ext cx="550507" cy="369332"/>
+          </a:xfrm>
+          <a:prstGeom prst="rect">
+            <a:avLst/>
+          </a:prstGeom>
+          <a:noFill/>
+        </p:spPr>
+        <p:txBody>
+          <a:bodyPr wrap="square" rtlCol="0">
+            <a:spAutoFit/>
+          </a:bodyPr>
+          <a:lstStyle/>
+          <a:p>
+            <a:r>
+              <a:rPr lang="en-US" dirty="0">
+                <a:solidFill>
+                  <a:schemeClr val="bg1"/>
+                </a:solidFill>
+              </a:rPr>
+              <a:t>No</a:t>
+            </a:r>
+          </a:p>
+        </p:txBody>
+      </p:sp>
+      <p:sp>
+        <p:nvSpPr>
+          <p:cNvPr id="43" name="Rectangle 42">
+            <a:extLst>
+              <a:ext uri="{FF2B5EF4-FFF2-40B4-BE49-F238E27FC236}">
+                <a16:creationId xmlns:a16="http://schemas.microsoft.com/office/drawing/2014/main" id="{EF836BB0-C720-E803-21E7-B9131B2FE27B}"/>
+              </a:ext>
+            </a:extLst>
+          </p:cNvPr>
+          <p:cNvSpPr/>
+          <p:nvPr/>
+        </p:nvSpPr>
+        <p:spPr>
+          <a:xfrm>
+            <a:off x="1254123" y="5134813"/>
+            <a:ext cx="3101602" cy="631485"/>
           </a:xfrm>
           <a:prstGeom prst="rect">
             <a:avLst/>
@@ -4885,20 +5356,272 @@
           <a:lstStyle/>
           <a:p>
             <a:pPr algn="ctr"/>
-            <a:r>
-              <a:rPr lang="en-US" sz="2000" dirty="0"/>
-              <a:t>I/O</a:t>
-            </a:r>
-            <a:br>
-              <a:rPr lang="en-US" sz="2000" dirty="0"/>
-            </a:br>
-            <a:r>
-              <a:rPr lang="en-US" sz="1200" dirty="0">
-                <a:latin typeface="Consolas" panose="020B0609020204030204" pitchFamily="49" charset="0"/>
+            <a:endParaRPr lang="en-US" sz="2000" dirty="0"/>
+          </a:p>
+        </p:txBody>
+      </p:sp>
+      <p:sp>
+        <p:nvSpPr>
+          <p:cNvPr id="7" name="Rectangle 6">
+            <a:extLst>
+              <a:ext uri="{FF2B5EF4-FFF2-40B4-BE49-F238E27FC236}">
+                <a16:creationId xmlns:a16="http://schemas.microsoft.com/office/drawing/2014/main" id="{30B5CAA7-7C21-FAE5-68A5-202189CB87DB}"/>
+              </a:ext>
+            </a:extLst>
+          </p:cNvPr>
+          <p:cNvSpPr/>
+          <p:nvPr/>
+        </p:nvSpPr>
+        <p:spPr>
+          <a:xfrm>
+            <a:off x="3336082" y="5203328"/>
+            <a:ext cx="952074" cy="502146"/>
+          </a:xfrm>
+          <a:prstGeom prst="rect">
+            <a:avLst/>
+          </a:prstGeom>
+          <a:solidFill>
+            <a:schemeClr val="accent1"/>
+          </a:solidFill>
+          <a:ln>
+            <a:noFill/>
+          </a:ln>
+        </p:spPr>
+        <p:style>
+          <a:lnRef idx="2">
+            <a:schemeClr val="accent1">
+              <a:shade val="50000"/>
+            </a:schemeClr>
+          </a:lnRef>
+          <a:fillRef idx="1">
+            <a:schemeClr val="accent1"/>
+          </a:fillRef>
+          <a:effectRef idx="0">
+            <a:schemeClr val="accent1"/>
+          </a:effectRef>
+          <a:fontRef idx="minor">
+            <a:schemeClr val="lt1"/>
+          </a:fontRef>
+        </p:style>
+        <p:txBody>
+          <a:bodyPr rtlCol="0" anchor="ctr"/>
+          <a:lstStyle/>
+          <a:p>
+            <a:pPr marL="0" marR="0" lvl="0" indent="0" algn="ctr" defTabSz="914400" rtl="0" eaLnBrk="1" fontAlgn="auto" latinLnBrk="0" hangingPunct="1">
+              <a:lnSpc>
+                <a:spcPct val="100000"/>
+              </a:lnSpc>
+              <a:spcBef>
+                <a:spcPts val="0"/>
+              </a:spcBef>
+              <a:spcAft>
+                <a:spcPts val="0"/>
+              </a:spcAft>
+              <a:buClrTx/>
+              <a:buSzTx/>
+              <a:buFontTx/>
+              <a:buNone/>
+              <a:tabLst/>
+              <a:defRPr/>
+            </a:pPr>
+            <a:r>
+              <a:rPr kumimoji="0" lang="en-US" b="0" i="0" u="none" strike="noStrike" kern="1200" cap="none" spc="0" normalizeH="0" baseline="0" noProof="0" dirty="0">
+                <a:ln>
+                  <a:noFill/>
+                </a:ln>
+                <a:solidFill>
+                  <a:prstClr val="white"/>
+                </a:solidFill>
+                <a:effectLst/>
+                <a:uLnTx/>
+                <a:uFillTx/>
+                <a:latin typeface="Calibri" panose="020F0502020204030204"/>
+                <a:ea typeface="+mn-ea"/>
+                <a:cs typeface="+mn-cs"/>
               </a:rPr>
-              <a:t>File</a:t>
-            </a:r>
-            <a:endParaRPr lang="en-US" sz="1050" dirty="0">
+              <a:t>STDERR</a:t>
+            </a:r>
+            <a:endParaRPr kumimoji="0" lang="en-US" sz="1200" b="0" i="0" u="none" strike="noStrike" kern="1200" cap="none" spc="0" normalizeH="0" baseline="0" noProof="0" dirty="0">
+              <a:ln>
+                <a:noFill/>
+              </a:ln>
+              <a:solidFill>
+                <a:prstClr val="white"/>
+              </a:solidFill>
+              <a:effectLst/>
+              <a:uLnTx/>
+              <a:uFillTx/>
+              <a:latin typeface="Consolas" panose="020B0609020204030204" pitchFamily="49" charset="0"/>
+              <a:ea typeface="+mn-ea"/>
+              <a:cs typeface="+mn-cs"/>
+            </a:endParaRPr>
+          </a:p>
+        </p:txBody>
+      </p:sp>
+      <p:sp>
+        <p:nvSpPr>
+          <p:cNvPr id="5" name="Rectangle 4">
+            <a:extLst>
+              <a:ext uri="{FF2B5EF4-FFF2-40B4-BE49-F238E27FC236}">
+                <a16:creationId xmlns:a16="http://schemas.microsoft.com/office/drawing/2014/main" id="{0E43C8D7-649E-BA12-79E8-708FBDA82E31}"/>
+              </a:ext>
+            </a:extLst>
+          </p:cNvPr>
+          <p:cNvSpPr/>
+          <p:nvPr/>
+        </p:nvSpPr>
+        <p:spPr>
+          <a:xfrm>
+            <a:off x="2330875" y="5204001"/>
+            <a:ext cx="952073" cy="501473"/>
+          </a:xfrm>
+          <a:prstGeom prst="rect">
+            <a:avLst/>
+          </a:prstGeom>
+          <a:solidFill>
+            <a:schemeClr val="accent1"/>
+          </a:solidFill>
+          <a:ln>
+            <a:noFill/>
+          </a:ln>
+        </p:spPr>
+        <p:style>
+          <a:lnRef idx="2">
+            <a:schemeClr val="accent1">
+              <a:shade val="50000"/>
+            </a:schemeClr>
+          </a:lnRef>
+          <a:fillRef idx="1">
+            <a:schemeClr val="accent1"/>
+          </a:fillRef>
+          <a:effectRef idx="0">
+            <a:schemeClr val="accent1"/>
+          </a:effectRef>
+          <a:fontRef idx="minor">
+            <a:schemeClr val="lt1"/>
+          </a:fontRef>
+        </p:style>
+        <p:txBody>
+          <a:bodyPr rtlCol="0" anchor="ctr"/>
+          <a:lstStyle/>
+          <a:p>
+            <a:pPr marL="0" marR="0" lvl="0" indent="0" algn="ctr" defTabSz="914400" rtl="0" eaLnBrk="1" fontAlgn="auto" latinLnBrk="0" hangingPunct="1">
+              <a:lnSpc>
+                <a:spcPct val="100000"/>
+              </a:lnSpc>
+              <a:spcBef>
+                <a:spcPts val="0"/>
+              </a:spcBef>
+              <a:spcAft>
+                <a:spcPts val="0"/>
+              </a:spcAft>
+              <a:buClrTx/>
+              <a:buSzTx/>
+              <a:buFontTx/>
+              <a:buNone/>
+              <a:tabLst/>
+              <a:defRPr/>
+            </a:pPr>
+            <a:r>
+              <a:rPr kumimoji="0" lang="en-US" b="0" i="0" u="none" strike="noStrike" kern="1200" cap="none" spc="0" normalizeH="0" baseline="0" noProof="0" dirty="0">
+                <a:ln>
+                  <a:noFill/>
+                </a:ln>
+                <a:solidFill>
+                  <a:prstClr val="white"/>
+                </a:solidFill>
+                <a:effectLst/>
+                <a:uLnTx/>
+                <a:uFillTx/>
+                <a:latin typeface="Calibri" panose="020F0502020204030204"/>
+                <a:ea typeface="+mn-ea"/>
+                <a:cs typeface="+mn-cs"/>
+              </a:rPr>
+              <a:t>STDOUT</a:t>
+            </a:r>
+            <a:endParaRPr kumimoji="0" lang="en-US" sz="1200" b="0" i="0" u="none" strike="noStrike" kern="1200" cap="none" spc="0" normalizeH="0" baseline="0" noProof="0" dirty="0">
+              <a:ln>
+                <a:noFill/>
+              </a:ln>
+              <a:solidFill>
+                <a:prstClr val="white"/>
+              </a:solidFill>
+              <a:effectLst/>
+              <a:uLnTx/>
+              <a:uFillTx/>
+              <a:latin typeface="Consolas" panose="020B0609020204030204" pitchFamily="49" charset="0"/>
+              <a:ea typeface="+mn-ea"/>
+              <a:cs typeface="+mn-cs"/>
+            </a:endParaRPr>
+          </a:p>
+        </p:txBody>
+      </p:sp>
+      <p:sp>
+        <p:nvSpPr>
+          <p:cNvPr id="4" name="Rectangle 3">
+            <a:extLst>
+              <a:ext uri="{FF2B5EF4-FFF2-40B4-BE49-F238E27FC236}">
+                <a16:creationId xmlns:a16="http://schemas.microsoft.com/office/drawing/2014/main" id="{FC698D39-78A3-E823-1C5B-20B502182FD2}"/>
+              </a:ext>
+            </a:extLst>
+          </p:cNvPr>
+          <p:cNvSpPr/>
+          <p:nvPr/>
+        </p:nvSpPr>
+        <p:spPr>
+          <a:xfrm>
+            <a:off x="1321689" y="5203328"/>
+            <a:ext cx="952072" cy="501474"/>
+          </a:xfrm>
+          <a:prstGeom prst="rect">
+            <a:avLst/>
+          </a:prstGeom>
+          <a:solidFill>
+            <a:schemeClr val="accent1"/>
+          </a:solidFill>
+          <a:ln>
+            <a:noFill/>
+          </a:ln>
+        </p:spPr>
+        <p:style>
+          <a:lnRef idx="2">
+            <a:schemeClr val="accent1">
+              <a:shade val="50000"/>
+            </a:schemeClr>
+          </a:lnRef>
+          <a:fillRef idx="1">
+            <a:schemeClr val="accent1"/>
+          </a:fillRef>
+          <a:effectRef idx="0">
+            <a:schemeClr val="accent1"/>
+          </a:effectRef>
+          <a:fontRef idx="minor">
+            <a:schemeClr val="lt1"/>
+          </a:fontRef>
+        </p:style>
+        <p:txBody>
+          <a:bodyPr rtlCol="0" anchor="ctr"/>
+          <a:lstStyle/>
+          <a:p>
+            <a:pPr algn="ctr"/>
+            <a:r>
+              <a:rPr kumimoji="0" lang="en-US" b="0" i="0" u="none" strike="noStrike" kern="1200" cap="none" spc="0" normalizeH="0" baseline="0" noProof="0" dirty="0">
+                <a:ln>
+                  <a:noFill/>
+                </a:ln>
+                <a:solidFill>
+                  <a:prstClr val="white"/>
+                </a:solidFill>
+                <a:effectLst/>
+                <a:uLnTx/>
+                <a:uFillTx/>
+                <a:latin typeface="Calibri" panose="020F0502020204030204"/>
+                <a:ea typeface="+mn-ea"/>
+                <a:cs typeface="+mn-cs"/>
+              </a:rPr>
+              <a:t>STDIN</a:t>
+            </a:r>
+            <a:endParaRPr lang="en-US" sz="1100" dirty="0">
               <a:latin typeface="Consolas" panose="020B0609020204030204" pitchFamily="49" charset="0"/>
             </a:endParaRPr>
           </a:p>
@@ -4906,10 +5629,10 @@
       </p:sp>
       <p:sp>
         <p:nvSpPr>
-          <p:cNvPr id="25" name="Rectangle 24">
-            <a:extLst>
-              <a:ext uri="{FF2B5EF4-FFF2-40B4-BE49-F238E27FC236}">
-                <a16:creationId xmlns:a16="http://schemas.microsoft.com/office/drawing/2014/main" id="{E27AEF1B-7539-1FC3-EF5A-904AE62F891B}"/>
+          <p:cNvPr id="46" name="Rectangle 45">
+            <a:extLst>
+              <a:ext uri="{FF2B5EF4-FFF2-40B4-BE49-F238E27FC236}">
+                <a16:creationId xmlns:a16="http://schemas.microsoft.com/office/drawing/2014/main" id="{21019A7F-07D9-DDBA-02C6-6183DDC3CC78}"/>
               </a:ext>
             </a:extLst>
           </p:cNvPr>
@@ -4918,8 +5641,8 @@
         </p:nvSpPr>
         <p:spPr>
           <a:xfrm>
-            <a:off x="1734220" y="5135502"/>
-            <a:ext cx="1615439" cy="938725"/>
+            <a:off x="4474052" y="5134813"/>
+            <a:ext cx="1029779" cy="631485"/>
           </a:xfrm>
           <a:prstGeom prst="rect">
             <a:avLst/>
@@ -4952,31 +5675,16 @@
           <a:lstStyle/>
           <a:p>
             <a:pPr algn="ctr"/>
-            <a:r>
-              <a:rPr lang="en-US" sz="2000" dirty="0"/>
-              <a:t>I/O</a:t>
-            </a:r>
-            <a:br>
-              <a:rPr lang="en-US" sz="2000" dirty="0"/>
-            </a:br>
-            <a:r>
-              <a:rPr lang="en-US" sz="1050" dirty="0">
-                <a:latin typeface="Consolas" panose="020B0609020204030204" pitchFamily="49" charset="0"/>
-              </a:rPr>
-              <a:t>STDERR,STDIN,STDOUT</a:t>
-            </a:r>
-            <a:endParaRPr lang="en-US" sz="1200" dirty="0">
-              <a:latin typeface="Consolas" panose="020B0609020204030204" pitchFamily="49" charset="0"/>
-            </a:endParaRPr>
-          </a:p>
-        </p:txBody>
-      </p:sp>
-      <p:sp>
-        <p:nvSpPr>
-          <p:cNvPr id="26" name="Diamond 25">
-            <a:extLst>
-              <a:ext uri="{FF2B5EF4-FFF2-40B4-BE49-F238E27FC236}">
-                <a16:creationId xmlns:a16="http://schemas.microsoft.com/office/drawing/2014/main" id="{4297B822-090C-34CA-C472-211BCA58A64D}"/>
+            <a:endParaRPr lang="en-US" sz="2000" dirty="0"/>
+          </a:p>
+        </p:txBody>
+      </p:sp>
+      <p:sp>
+        <p:nvSpPr>
+          <p:cNvPr id="24" name="Rectangle 23">
+            <a:extLst>
+              <a:ext uri="{FF2B5EF4-FFF2-40B4-BE49-F238E27FC236}">
+                <a16:creationId xmlns:a16="http://schemas.microsoft.com/office/drawing/2014/main" id="{1CA2A669-77C3-9387-DB3B-2D8BE0E6734C}"/>
               </a:ext>
             </a:extLst>
           </p:cNvPr>
@@ -4985,14 +5693,14 @@
         </p:nvSpPr>
         <p:spPr>
           <a:xfrm>
-            <a:off x="1458407" y="3237412"/>
-            <a:ext cx="2167067" cy="1381112"/>
-          </a:xfrm>
-          <a:prstGeom prst="diamond">
+            <a:off x="4534986" y="5203328"/>
+            <a:ext cx="897491" cy="501475"/>
+          </a:xfrm>
+          <a:prstGeom prst="rect">
             <a:avLst/>
           </a:prstGeom>
           <a:solidFill>
-            <a:schemeClr val="tx2"/>
+            <a:schemeClr val="accent1"/>
           </a:solidFill>
           <a:ln>
             <a:noFill/>
@@ -5015,183 +5723,25 @@
           </a:fontRef>
         </p:style>
         <p:txBody>
-          <a:bodyPr rtlCol="0" anchor="ctr"/>
+          <a:bodyPr rtlCol="0" anchor="ctr">
+            <a:normAutofit fontScale="85000" lnSpcReduction="20000"/>
+          </a:bodyPr>
           <a:lstStyle/>
           <a:p>
             <a:pPr algn="ctr"/>
             <a:r>
               <a:rPr lang="en-US" dirty="0"/>
-              <a:t>Standard stream ?</a:t>
-            </a:r>
-          </a:p>
-        </p:txBody>
-      </p:sp>
-      <p:cxnSp>
-        <p:nvCxnSpPr>
-          <p:cNvPr id="27" name="Straight Arrow Connector 26">
-            <a:extLst>
-              <a:ext uri="{FF2B5EF4-FFF2-40B4-BE49-F238E27FC236}">
-                <a16:creationId xmlns:a16="http://schemas.microsoft.com/office/drawing/2014/main" id="{43C8CF48-F0A9-6AF2-01DE-448F936D39D3}"/>
-              </a:ext>
-            </a:extLst>
-          </p:cNvPr>
-          <p:cNvCxnSpPr>
-            <a:cxnSpLocks/>
-            <a:stCxn id="26" idx="2"/>
-            <a:endCxn id="25" idx="0"/>
-          </p:cNvCxnSpPr>
-          <p:nvPr/>
-        </p:nvCxnSpPr>
-        <p:spPr>
-          <a:xfrm flipH="1">
-            <a:off x="2541940" y="4618524"/>
-            <a:ext cx="1" cy="516978"/>
-          </a:xfrm>
-          <a:prstGeom prst="straightConnector1">
-            <a:avLst/>
-          </a:prstGeom>
-          <a:ln w="76200">
-            <a:solidFill>
-              <a:schemeClr val="tx2"/>
-            </a:solidFill>
-            <a:tailEnd type="triangle"/>
-          </a:ln>
-        </p:spPr>
-        <p:style>
-          <a:lnRef idx="1">
-            <a:schemeClr val="accent1"/>
-          </a:lnRef>
-          <a:fillRef idx="0">
-            <a:schemeClr val="accent1"/>
-          </a:fillRef>
-          <a:effectRef idx="0">
-            <a:schemeClr val="accent1"/>
-          </a:effectRef>
-          <a:fontRef idx="minor">
-            <a:schemeClr val="tx1"/>
-          </a:fontRef>
-        </p:style>
-      </p:cxnSp>
-      <p:cxnSp>
-        <p:nvCxnSpPr>
-          <p:cNvPr id="28" name="Connector: Elbow 27">
-            <a:extLst>
-              <a:ext uri="{FF2B5EF4-FFF2-40B4-BE49-F238E27FC236}">
-                <a16:creationId xmlns:a16="http://schemas.microsoft.com/office/drawing/2014/main" id="{DEE2ABEA-D559-3DC2-A34F-BFD4C0342DA6}"/>
-              </a:ext>
-            </a:extLst>
-          </p:cNvPr>
-          <p:cNvCxnSpPr>
-            <a:stCxn id="26" idx="3"/>
-            <a:endCxn id="24" idx="0"/>
-          </p:cNvCxnSpPr>
-          <p:nvPr/>
-        </p:nvCxnSpPr>
-        <p:spPr>
-          <a:xfrm>
-            <a:off x="3625474" y="3927968"/>
-            <a:ext cx="923918" cy="1206844"/>
-          </a:xfrm>
-          <a:prstGeom prst="bentConnector2">
-            <a:avLst/>
-          </a:prstGeom>
-          <a:ln w="76200">
-            <a:solidFill>
-              <a:schemeClr val="tx2"/>
-            </a:solidFill>
-            <a:tailEnd type="triangle"/>
-          </a:ln>
-        </p:spPr>
-        <p:style>
-          <a:lnRef idx="1">
-            <a:schemeClr val="accent1"/>
-          </a:lnRef>
-          <a:fillRef idx="0">
-            <a:schemeClr val="accent1"/>
-          </a:fillRef>
-          <a:effectRef idx="0">
-            <a:schemeClr val="accent1"/>
-          </a:effectRef>
-          <a:fontRef idx="minor">
-            <a:schemeClr val="tx1"/>
-          </a:fontRef>
-        </p:style>
-      </p:cxnSp>
-      <p:sp>
-        <p:nvSpPr>
-          <p:cNvPr id="29" name="TextBox 28">
-            <a:extLst>
-              <a:ext uri="{FF2B5EF4-FFF2-40B4-BE49-F238E27FC236}">
-                <a16:creationId xmlns:a16="http://schemas.microsoft.com/office/drawing/2014/main" id="{78E7C250-8779-610F-2B56-2FEC7391FF0B}"/>
-              </a:ext>
-            </a:extLst>
-          </p:cNvPr>
-          <p:cNvSpPr txBox="1"/>
-          <p:nvPr/>
-        </p:nvSpPr>
-        <p:spPr>
-          <a:xfrm>
-            <a:off x="2542502" y="4594150"/>
-            <a:ext cx="550507" cy="369332"/>
-          </a:xfrm>
-          <a:prstGeom prst="rect">
-            <a:avLst/>
-          </a:prstGeom>
-          <a:noFill/>
-        </p:spPr>
-        <p:txBody>
-          <a:bodyPr wrap="square" rtlCol="0">
-            <a:spAutoFit/>
-          </a:bodyPr>
-          <a:lstStyle/>
-          <a:p>
-            <a:r>
-              <a:rPr lang="en-US" dirty="0">
-                <a:solidFill>
-                  <a:schemeClr val="bg1"/>
-                </a:solidFill>
-              </a:rPr>
-              <a:t>Yes</a:t>
-            </a:r>
-          </a:p>
-        </p:txBody>
-      </p:sp>
-      <p:sp>
-        <p:nvSpPr>
-          <p:cNvPr id="30" name="TextBox 29">
-            <a:extLst>
-              <a:ext uri="{FF2B5EF4-FFF2-40B4-BE49-F238E27FC236}">
-                <a16:creationId xmlns:a16="http://schemas.microsoft.com/office/drawing/2014/main" id="{D0650F85-FD94-7FC8-3AA0-B287689DAFF6}"/>
-              </a:ext>
-            </a:extLst>
-          </p:cNvPr>
-          <p:cNvSpPr txBox="1"/>
-          <p:nvPr/>
-        </p:nvSpPr>
-        <p:spPr>
-          <a:xfrm>
-            <a:off x="3525635" y="3558636"/>
-            <a:ext cx="550507" cy="369332"/>
-          </a:xfrm>
-          <a:prstGeom prst="rect">
-            <a:avLst/>
-          </a:prstGeom>
-          <a:noFill/>
-        </p:spPr>
-        <p:txBody>
-          <a:bodyPr wrap="square" rtlCol="0">
-            <a:spAutoFit/>
-          </a:bodyPr>
-          <a:lstStyle/>
-          <a:p>
-            <a:r>
-              <a:rPr lang="en-US" dirty="0">
-                <a:solidFill>
-                  <a:schemeClr val="bg1"/>
-                </a:solidFill>
-              </a:rPr>
-              <a:t>No</a:t>
-            </a:r>
+              <a:t>File</a:t>
+            </a:r>
+            <a:r>
+              <a:rPr lang="en-US" sz="2000" dirty="0"/>
+              <a:t> </a:t>
+            </a:r>
+            <a:r>
+              <a:rPr lang="en-US" dirty="0"/>
+              <a:t>Interface</a:t>
+            </a:r>
+            <a:endParaRPr lang="en-US" sz="2000" dirty="0"/>
           </a:p>
         </p:txBody>
       </p:sp>
@@ -5325,7 +5875,9 @@
           </a:fontRef>
         </p:style>
         <p:txBody>
-          <a:bodyPr rtlCol="0" anchor="ctr"/>
+          <a:bodyPr rtlCol="0" anchor="ctr">
+            <a:noAutofit/>
+          </a:bodyPr>
           <a:lstStyle/>
           <a:p>
             <a:pPr marL="0" marR="0" lvl="0" indent="0" algn="ctr" defTabSz="914400" rtl="0" eaLnBrk="1" fontAlgn="auto" latinLnBrk="0" hangingPunct="1">
@@ -5346,40 +5898,7 @@
               <a:defRPr/>
             </a:pPr>
             <a:r>
-              <a:rPr kumimoji="0" lang="en-US" sz="2000" b="0" i="0" u="none" strike="noStrike" kern="1200" cap="none" spc="0" normalizeH="0" baseline="0" noProof="0" dirty="0">
-                <a:ln>
-                  <a:noFill/>
-                </a:ln>
-                <a:solidFill>
-                  <a:prstClr val="white"/>
-                </a:solidFill>
-                <a:effectLst/>
-                <a:uLnTx/>
-                <a:uFillTx/>
-                <a:latin typeface="Calibri" panose="020F0502020204030204"/>
-                <a:ea typeface="+mn-ea"/>
-                <a:cs typeface="+mn-cs"/>
-              </a:rPr>
-              <a:t>I/O</a:t>
-            </a:r>
-            <a:br>
-              <a:rPr kumimoji="0" lang="en-US" sz="2000" b="0" i="0" u="none" strike="noStrike" kern="1200" cap="none" spc="0" normalizeH="0" baseline="0" noProof="0" dirty="0">
-                <a:ln>
-                  <a:noFill/>
-                </a:ln>
-                <a:solidFill>
-                  <a:prstClr val="white"/>
-                </a:solidFill>
-                <a:effectLst/>
-                <a:uLnTx/>
-                <a:uFillTx/>
-                <a:latin typeface="Calibri" panose="020F0502020204030204"/>
-                <a:ea typeface="+mn-ea"/>
-                <a:cs typeface="+mn-cs"/>
-              </a:rPr>
-            </a:br>
-            <a:r>
-              <a:rPr kumimoji="0" lang="en-US" sz="1050" b="0" i="0" u="none" strike="noStrike" kern="1200" cap="none" spc="0" normalizeH="0" baseline="0" noProof="0" dirty="0">
+              <a:rPr kumimoji="0" lang="en-US" sz="1200" b="0" i="0" u="none" strike="noStrike" kern="1200" cap="none" spc="0" normalizeH="0" baseline="0" noProof="0" dirty="0">
                 <a:ln>
                   <a:noFill/>
                 </a:ln>
@@ -5395,7 +5914,7 @@
               </a:rPr>
               <a:t>STDERR,STDIN,STDOUT</a:t>
             </a:r>
-            <a:endParaRPr kumimoji="0" lang="en-US" sz="1200" b="0" i="0" u="none" strike="noStrike" kern="1200" cap="none" spc="0" normalizeH="0" baseline="0" noProof="0" dirty="0">
+            <a:endParaRPr kumimoji="0" lang="en-US" sz="1600" b="0" i="0" u="none" strike="noStrike" kern="1200" cap="none" spc="0" normalizeH="0" baseline="0" noProof="0" dirty="0">
               <a:ln>
                 <a:noFill/>
               </a:ln>
@@ -5619,7 +6138,7 @@
               <a:rPr lang="en-US" sz="1200" dirty="0">
                 <a:latin typeface="Consolas" panose="020B0609020204030204" pitchFamily="49" charset="0"/>
               </a:rPr>
-              <a:t>EVR</a:t>
+              <a:t>Event Recorder</a:t>
             </a:r>
           </a:p>
         </p:txBody>
@@ -5733,7 +6252,7 @@
               <a:rPr lang="en-US" sz="1200" dirty="0">
                 <a:latin typeface="Consolas" panose="020B0609020204030204" pitchFamily="49" charset="0"/>
               </a:rPr>
-              <a:t>User</a:t>
+              <a:t>Custom</a:t>
             </a:r>
           </a:p>
         </p:txBody>
@@ -5873,40 +6392,7 @@
                 <a:ea typeface="+mn-ea"/>
                 <a:cs typeface="+mn-cs"/>
               </a:rPr>
-              <a:t>I/O</a:t>
-            </a:r>
-            <a:br>
-              <a:rPr kumimoji="0" lang="en-US" sz="2000" b="0" i="0" u="none" strike="noStrike" kern="1200" cap="none" spc="0" normalizeH="0" baseline="0" noProof="0" dirty="0">
-                <a:ln>
-                  <a:noFill/>
-                </a:ln>
-                <a:solidFill>
-                  <a:prstClr val="white"/>
-                </a:solidFill>
-                <a:effectLst/>
-                <a:uLnTx/>
-                <a:uFillTx/>
-                <a:latin typeface="Calibri" panose="020F0502020204030204"/>
-                <a:ea typeface="+mn-ea"/>
-                <a:cs typeface="+mn-cs"/>
-              </a:rPr>
-            </a:br>
-            <a:r>
-              <a:rPr kumimoji="0" lang="en-US" sz="1050" b="0" i="0" u="none" strike="noStrike" kern="1200" cap="none" spc="0" normalizeH="0" baseline="0" noProof="0" dirty="0">
-                <a:ln>
-                  <a:noFill/>
-                </a:ln>
-                <a:solidFill>
-                  <a:prstClr val="white"/>
-                </a:solidFill>
-                <a:effectLst/>
-                <a:uLnTx/>
-                <a:uFillTx/>
-                <a:latin typeface="Consolas" panose="020B0609020204030204" pitchFamily="49" charset="0"/>
-                <a:ea typeface="+mn-ea"/>
-                <a:cs typeface="+mn-cs"/>
-              </a:rPr>
-              <a:t>File</a:t>
+              <a:t>File Interface</a:t>
             </a:r>
             <a:endParaRPr kumimoji="0" lang="en-US" sz="1200" b="0" i="0" u="none" strike="noStrike" kern="1200" cap="none" spc="0" normalizeH="0" baseline="0" noProof="0" dirty="0">
               <a:ln>
@@ -6132,7 +6618,7 @@
               <a:rPr lang="en-US" sz="1200" dirty="0">
                 <a:latin typeface="Consolas" panose="020B0609020204030204" pitchFamily="49" charset="0"/>
               </a:rPr>
-              <a:t>File Interface</a:t>
+              <a:t>Custom</a:t>
             </a:r>
           </a:p>
         </p:txBody>

</xml_diff>

<commit_message>
Introduce STDERR, STDIN, STDOUT APIs and components (#27)
</commit_message>
<xml_diff>
--- a/documentation/doxygen/src/images/blocks.pptx
+++ b/documentation/doxygen/src/images/blocks.pptx
@@ -273,7 +273,7 @@
           <a:p>
             <a:fld id="{E1BCA6AF-7F69-456D-BB79-EC94A44BF887}" type="datetimeFigureOut">
               <a:rPr lang="en-US" smtClean="0"/>
-              <a:t>5/10/2023</a:t>
+              <a:t>11/10/2023</a:t>
             </a:fld>
             <a:endParaRPr lang="en-US"/>
           </a:p>
@@ -471,7 +471,7 @@
           <a:p>
             <a:fld id="{E1BCA6AF-7F69-456D-BB79-EC94A44BF887}" type="datetimeFigureOut">
               <a:rPr lang="en-US" smtClean="0"/>
-              <a:t>5/10/2023</a:t>
+              <a:t>11/10/2023</a:t>
             </a:fld>
             <a:endParaRPr lang="en-US"/>
           </a:p>
@@ -679,7 +679,7 @@
           <a:p>
             <a:fld id="{E1BCA6AF-7F69-456D-BB79-EC94A44BF887}" type="datetimeFigureOut">
               <a:rPr lang="en-US" smtClean="0"/>
-              <a:t>5/10/2023</a:t>
+              <a:t>11/10/2023</a:t>
             </a:fld>
             <a:endParaRPr lang="en-US"/>
           </a:p>
@@ -877,7 +877,7 @@
           <a:p>
             <a:fld id="{E1BCA6AF-7F69-456D-BB79-EC94A44BF887}" type="datetimeFigureOut">
               <a:rPr lang="en-US" smtClean="0"/>
-              <a:t>5/10/2023</a:t>
+              <a:t>11/10/2023</a:t>
             </a:fld>
             <a:endParaRPr lang="en-US"/>
           </a:p>
@@ -1152,7 +1152,7 @@
           <a:p>
             <a:fld id="{E1BCA6AF-7F69-456D-BB79-EC94A44BF887}" type="datetimeFigureOut">
               <a:rPr lang="en-US" smtClean="0"/>
-              <a:t>5/10/2023</a:t>
+              <a:t>11/10/2023</a:t>
             </a:fld>
             <a:endParaRPr lang="en-US"/>
           </a:p>
@@ -1417,7 +1417,7 @@
           <a:p>
             <a:fld id="{E1BCA6AF-7F69-456D-BB79-EC94A44BF887}" type="datetimeFigureOut">
               <a:rPr lang="en-US" smtClean="0"/>
-              <a:t>5/10/2023</a:t>
+              <a:t>11/10/2023</a:t>
             </a:fld>
             <a:endParaRPr lang="en-US"/>
           </a:p>
@@ -1829,7 +1829,7 @@
           <a:p>
             <a:fld id="{E1BCA6AF-7F69-456D-BB79-EC94A44BF887}" type="datetimeFigureOut">
               <a:rPr lang="en-US" smtClean="0"/>
-              <a:t>5/10/2023</a:t>
+              <a:t>11/10/2023</a:t>
             </a:fld>
             <a:endParaRPr lang="en-US"/>
           </a:p>
@@ -1970,7 +1970,7 @@
           <a:p>
             <a:fld id="{E1BCA6AF-7F69-456D-BB79-EC94A44BF887}" type="datetimeFigureOut">
               <a:rPr lang="en-US" smtClean="0"/>
-              <a:t>5/10/2023</a:t>
+              <a:t>11/10/2023</a:t>
             </a:fld>
             <a:endParaRPr lang="en-US"/>
           </a:p>
@@ -2083,7 +2083,7 @@
           <a:p>
             <a:fld id="{E1BCA6AF-7F69-456D-BB79-EC94A44BF887}" type="datetimeFigureOut">
               <a:rPr lang="en-US" smtClean="0"/>
-              <a:t>5/10/2023</a:t>
+              <a:t>11/10/2023</a:t>
             </a:fld>
             <a:endParaRPr lang="en-US"/>
           </a:p>
@@ -2394,7 +2394,7 @@
           <a:p>
             <a:fld id="{E1BCA6AF-7F69-456D-BB79-EC94A44BF887}" type="datetimeFigureOut">
               <a:rPr lang="en-US" smtClean="0"/>
-              <a:t>5/10/2023</a:t>
+              <a:t>11/10/2023</a:t>
             </a:fld>
             <a:endParaRPr lang="en-US"/>
           </a:p>
@@ -2682,7 +2682,7 @@
           <a:p>
             <a:fld id="{E1BCA6AF-7F69-456D-BB79-EC94A44BF887}" type="datetimeFigureOut">
               <a:rPr lang="en-US" smtClean="0"/>
-              <a:t>5/10/2023</a:t>
+              <a:t>11/10/2023</a:t>
             </a:fld>
             <a:endParaRPr lang="en-US"/>
           </a:p>
@@ -2923,7 +2923,7 @@
           <a:p>
             <a:fld id="{E1BCA6AF-7F69-456D-BB79-EC94A44BF887}" type="datetimeFigureOut">
               <a:rPr lang="en-US" smtClean="0"/>
-              <a:t>5/10/2023</a:t>
+              <a:t>11/10/2023</a:t>
             </a:fld>
             <a:endParaRPr lang="en-US"/>
           </a:p>
@@ -3342,10 +3342,10 @@
       </p:grpSpPr>
       <p:sp>
         <p:nvSpPr>
-          <p:cNvPr id="22" name="Rectangle 21">
-            <a:extLst>
-              <a:ext uri="{FF2B5EF4-FFF2-40B4-BE49-F238E27FC236}">
-                <a16:creationId xmlns:a16="http://schemas.microsoft.com/office/drawing/2014/main" id="{6ACD23E5-9F77-BE44-84DB-9F32EFC5D735}"/>
+          <p:cNvPr id="6" name="Rectangle 5">
+            <a:extLst>
+              <a:ext uri="{FF2B5EF4-FFF2-40B4-BE49-F238E27FC236}">
+                <a16:creationId xmlns:a16="http://schemas.microsoft.com/office/drawing/2014/main" id="{59D80D6B-2597-378A-D104-F3DABE4644E4}"/>
               </a:ext>
             </a:extLst>
           </p:cNvPr>
@@ -3354,8 +3354,60 @@
         </p:nvSpPr>
         <p:spPr>
           <a:xfrm>
-            <a:off x="444138" y="592183"/>
-            <a:ext cx="6792686" cy="2483628"/>
+            <a:off x="444136" y="592183"/>
+            <a:ext cx="11362959" cy="4319442"/>
+          </a:xfrm>
+          <a:prstGeom prst="rect">
+            <a:avLst/>
+          </a:prstGeom>
+          <a:solidFill>
+            <a:schemeClr val="bg1"/>
+          </a:solidFill>
+          <a:ln>
+            <a:noFill/>
+          </a:ln>
+        </p:spPr>
+        <p:style>
+          <a:lnRef idx="2">
+            <a:schemeClr val="accent1">
+              <a:shade val="50000"/>
+            </a:schemeClr>
+          </a:lnRef>
+          <a:fillRef idx="1">
+            <a:schemeClr val="accent1"/>
+          </a:fillRef>
+          <a:effectRef idx="0">
+            <a:schemeClr val="accent1"/>
+          </a:effectRef>
+          <a:fontRef idx="minor">
+            <a:schemeClr val="lt1"/>
+          </a:fontRef>
+        </p:style>
+        <p:txBody>
+          <a:bodyPr vert="vert270" rtlCol="0" anchor="t"/>
+          <a:lstStyle/>
+          <a:p>
+            <a:pPr algn="ctr"/>
+            <a:endParaRPr lang="en-US" dirty="0"/>
+          </a:p>
+        </p:txBody>
+      </p:sp>
+      <p:sp>
+        <p:nvSpPr>
+          <p:cNvPr id="22" name="Rectangle 21">
+            <a:extLst>
+              <a:ext uri="{FF2B5EF4-FFF2-40B4-BE49-F238E27FC236}">
+                <a16:creationId xmlns:a16="http://schemas.microsoft.com/office/drawing/2014/main" id="{6ACD23E5-9F77-BE44-84DB-9F32EFC5D735}"/>
+              </a:ext>
+            </a:extLst>
+          </p:cNvPr>
+          <p:cNvSpPr/>
+          <p:nvPr/>
+        </p:nvSpPr>
+        <p:spPr>
+          <a:xfrm>
+            <a:off x="444137" y="592183"/>
+            <a:ext cx="7941873" cy="2483628"/>
           </a:xfrm>
           <a:prstGeom prst="rect">
             <a:avLst/>
@@ -3410,8 +3462,8 @@
         </p:nvSpPr>
         <p:spPr>
           <a:xfrm>
-            <a:off x="444138" y="3293527"/>
-            <a:ext cx="6792686" cy="1618098"/>
+            <a:off x="444136" y="3293527"/>
+            <a:ext cx="7941873" cy="1618098"/>
           </a:xfrm>
           <a:prstGeom prst="rect">
             <a:avLst/>
@@ -3467,7 +3519,7 @@
         <p:spPr>
           <a:xfrm>
             <a:off x="1172094" y="748145"/>
-            <a:ext cx="5864431" cy="900000"/>
+            <a:ext cx="7051496" cy="900000"/>
           </a:xfrm>
           <a:prstGeom prst="rect">
             <a:avLst/>
@@ -3544,8 +3596,8 @@
         </p:nvSpPr>
         <p:spPr>
           <a:xfrm>
-            <a:off x="1172095" y="1976870"/>
-            <a:ext cx="3600000" cy="900000"/>
+            <a:off x="1172094" y="1976870"/>
+            <a:ext cx="4768335" cy="900000"/>
           </a:xfrm>
           <a:prstGeom prst="rect">
             <a:avLst/>
@@ -3602,8 +3654,8 @@
         </p:nvCxnSpPr>
         <p:spPr>
           <a:xfrm>
-            <a:off x="2972095" y="1648145"/>
-            <a:ext cx="0" cy="328725"/>
+            <a:off x="3556261" y="1647347"/>
+            <a:ext cx="1" cy="329523"/>
           </a:xfrm>
           <a:prstGeom prst="straightConnector1">
             <a:avLst/>
@@ -3688,8 +3740,8 @@
         </p:nvSpPr>
         <p:spPr>
           <a:xfrm>
-            <a:off x="7676715" y="1362506"/>
-            <a:ext cx="3012964" cy="900000"/>
+            <a:off x="8863779" y="1362506"/>
+            <a:ext cx="2943317" cy="900000"/>
           </a:xfrm>
           <a:prstGeom prst="rect">
             <a:avLst/>
@@ -3749,7 +3801,7 @@
         </p:nvSpPr>
         <p:spPr>
           <a:xfrm>
-            <a:off x="5012572" y="3472361"/>
+            <a:off x="6193537" y="3470002"/>
             <a:ext cx="1888077" cy="1221548"/>
           </a:xfrm>
           <a:prstGeom prst="rect">
@@ -3805,7 +3857,7 @@
         </p:nvSpPr>
         <p:spPr>
           <a:xfrm>
-            <a:off x="4868881" y="1980062"/>
+            <a:off x="6055945" y="1980062"/>
             <a:ext cx="2167645" cy="900000"/>
           </a:xfrm>
           <a:prstGeom prst="rect">
@@ -3869,7 +3921,7 @@
         </p:nvCxnSpPr>
         <p:spPr>
           <a:xfrm>
-            <a:off x="3706339" y="2876870"/>
+            <a:off x="5288491" y="2878613"/>
             <a:ext cx="0" cy="595492"/>
           </a:xfrm>
           <a:prstGeom prst="straightConnector1">
@@ -3914,9 +3966,9 @@
           <p:nvPr/>
         </p:nvCxnSpPr>
         <p:spPr>
-          <a:xfrm>
-            <a:off x="5952704" y="2880062"/>
-            <a:ext cx="3907" cy="592299"/>
+          <a:xfrm flipH="1">
+            <a:off x="7137576" y="2880062"/>
+            <a:ext cx="2192" cy="589940"/>
           </a:xfrm>
           <a:prstGeom prst="straightConnector1">
             <a:avLst/>
@@ -3960,7 +4012,7 @@
         </p:nvCxnSpPr>
         <p:spPr>
           <a:xfrm>
-            <a:off x="5952704" y="1648145"/>
+            <a:off x="7139768" y="1648145"/>
             <a:ext cx="0" cy="331917"/>
           </a:xfrm>
           <a:prstGeom prst="straightConnector1">
@@ -4002,7 +4054,7 @@
         </p:nvSpPr>
         <p:spPr>
           <a:xfrm>
-            <a:off x="7679036" y="3633135"/>
+            <a:off x="8863695" y="3606270"/>
             <a:ext cx="2250375" cy="900000"/>
           </a:xfrm>
           <a:prstGeom prst="rect">
@@ -4063,7 +4115,7 @@
         </p:nvSpPr>
         <p:spPr>
           <a:xfrm>
-            <a:off x="7314459" y="748144"/>
+            <a:off x="8501523" y="748144"/>
             <a:ext cx="362172" cy="2128725"/>
           </a:xfrm>
           <a:prstGeom prst="rightBrace">
@@ -4268,8 +4320,8 @@
         </p:nvSpPr>
         <p:spPr>
           <a:xfrm>
-            <a:off x="1172094" y="3472361"/>
-            <a:ext cx="3478282" cy="1221548"/>
+            <a:off x="1221204" y="3472361"/>
+            <a:ext cx="4719225" cy="1221548"/>
           </a:xfrm>
           <a:prstGeom prst="rect">
             <a:avLst/>
@@ -4320,8 +4372,8 @@
         </p:nvSpPr>
         <p:spPr>
           <a:xfrm>
-            <a:off x="1324945" y="3606270"/>
-            <a:ext cx="1437353" cy="938725"/>
+            <a:off x="1324946" y="3606270"/>
+            <a:ext cx="1144078" cy="938725"/>
           </a:xfrm>
           <a:prstGeom prst="rect">
             <a:avLst/>
@@ -4363,10 +4415,10 @@
       </p:sp>
       <p:sp>
         <p:nvSpPr>
-          <p:cNvPr id="12" name="Rectangle 11">
-            <a:extLst>
-              <a:ext uri="{FF2B5EF4-FFF2-40B4-BE49-F238E27FC236}">
-                <a16:creationId xmlns:a16="http://schemas.microsoft.com/office/drawing/2014/main" id="{A21F38A5-4A7C-382B-B245-C6BD6FEE7158}"/>
+          <p:cNvPr id="16" name="Rectangle 15">
+            <a:extLst>
+              <a:ext uri="{FF2B5EF4-FFF2-40B4-BE49-F238E27FC236}">
+                <a16:creationId xmlns:a16="http://schemas.microsoft.com/office/drawing/2014/main" id="{BFD001A7-7987-3E47-D9FF-E1D262C3E8F7}"/>
               </a:ext>
             </a:extLst>
           </p:cNvPr>
@@ -4375,8 +4427,8 @@
         </p:nvSpPr>
         <p:spPr>
           <a:xfrm>
-            <a:off x="2911235" y="3600313"/>
-            <a:ext cx="1615439" cy="938725"/>
+            <a:off x="3638374" y="3606270"/>
+            <a:ext cx="1059468" cy="938725"/>
           </a:xfrm>
           <a:prstGeom prst="rect">
             <a:avLst/>
@@ -4411,16 +4463,7 @@
             <a:pPr algn="ctr"/>
             <a:r>
               <a:rPr lang="en-US" sz="2000" dirty="0"/>
-              <a:t>I/O</a:t>
-            </a:r>
-            <a:br>
-              <a:rPr lang="en-US" sz="2000" dirty="0"/>
-            </a:br>
-            <a:r>
-              <a:rPr lang="en-US" sz="1050" dirty="0">
-                <a:latin typeface="Consolas" panose="020B0609020204030204" pitchFamily="49" charset="0"/>
-              </a:rPr>
-              <a:t>STDERR,STDIN,STDOUT</a:t>
+              <a:t>STDOUT</a:t>
             </a:r>
             <a:endParaRPr lang="en-US" sz="1200" dirty="0">
               <a:latin typeface="Consolas" panose="020B0609020204030204" pitchFamily="49" charset="0"/>
@@ -4428,6 +4471,210 @@
           </a:p>
         </p:txBody>
       </p:sp>
+      <p:sp>
+        <p:nvSpPr>
+          <p:cNvPr id="17" name="Rectangle 16">
+            <a:extLst>
+              <a:ext uri="{FF2B5EF4-FFF2-40B4-BE49-F238E27FC236}">
+                <a16:creationId xmlns:a16="http://schemas.microsoft.com/office/drawing/2014/main" id="{CB817C28-F4C7-F551-69C2-04F57D8D7611}"/>
+              </a:ext>
+            </a:extLst>
+          </p:cNvPr>
+          <p:cNvSpPr/>
+          <p:nvPr/>
+        </p:nvSpPr>
+        <p:spPr>
+          <a:xfrm>
+            <a:off x="2522118" y="3606270"/>
+            <a:ext cx="1059468" cy="938725"/>
+          </a:xfrm>
+          <a:prstGeom prst="rect">
+            <a:avLst/>
+          </a:prstGeom>
+          <a:solidFill>
+            <a:schemeClr val="tx2"/>
+          </a:solidFill>
+          <a:ln>
+            <a:noFill/>
+          </a:ln>
+        </p:spPr>
+        <p:style>
+          <a:lnRef idx="2">
+            <a:schemeClr val="accent1">
+              <a:shade val="50000"/>
+            </a:schemeClr>
+          </a:lnRef>
+          <a:fillRef idx="1">
+            <a:schemeClr val="accent1"/>
+          </a:fillRef>
+          <a:effectRef idx="0">
+            <a:schemeClr val="accent1"/>
+          </a:effectRef>
+          <a:fontRef idx="minor">
+            <a:schemeClr val="lt1"/>
+          </a:fontRef>
+        </p:style>
+        <p:txBody>
+          <a:bodyPr rtlCol="0" anchor="ctr"/>
+          <a:lstStyle/>
+          <a:p>
+            <a:pPr algn="ctr"/>
+            <a:r>
+              <a:rPr lang="en-US" sz="2000" dirty="0"/>
+              <a:t>STDIN</a:t>
+            </a:r>
+            <a:endParaRPr lang="en-US" sz="1200" dirty="0">
+              <a:latin typeface="Consolas" panose="020B0609020204030204" pitchFamily="49" charset="0"/>
+            </a:endParaRPr>
+          </a:p>
+        </p:txBody>
+      </p:sp>
+      <p:sp>
+        <p:nvSpPr>
+          <p:cNvPr id="23" name="Rectangle 22">
+            <a:extLst>
+              <a:ext uri="{FF2B5EF4-FFF2-40B4-BE49-F238E27FC236}">
+                <a16:creationId xmlns:a16="http://schemas.microsoft.com/office/drawing/2014/main" id="{7EE09DA7-C287-16D7-2850-AB3F34797EE3}"/>
+              </a:ext>
+            </a:extLst>
+          </p:cNvPr>
+          <p:cNvSpPr/>
+          <p:nvPr/>
+        </p:nvSpPr>
+        <p:spPr>
+          <a:xfrm>
+            <a:off x="4754630" y="3606270"/>
+            <a:ext cx="1059468" cy="938725"/>
+          </a:xfrm>
+          <a:prstGeom prst="rect">
+            <a:avLst/>
+          </a:prstGeom>
+          <a:solidFill>
+            <a:schemeClr val="tx2"/>
+          </a:solidFill>
+          <a:ln>
+            <a:noFill/>
+          </a:ln>
+        </p:spPr>
+        <p:style>
+          <a:lnRef idx="2">
+            <a:schemeClr val="accent1">
+              <a:shade val="50000"/>
+            </a:schemeClr>
+          </a:lnRef>
+          <a:fillRef idx="1">
+            <a:schemeClr val="accent1"/>
+          </a:fillRef>
+          <a:effectRef idx="0">
+            <a:schemeClr val="accent1"/>
+          </a:effectRef>
+          <a:fontRef idx="minor">
+            <a:schemeClr val="lt1"/>
+          </a:fontRef>
+        </p:style>
+        <p:txBody>
+          <a:bodyPr rtlCol="0" anchor="ctr"/>
+          <a:lstStyle/>
+          <a:p>
+            <a:pPr algn="ctr"/>
+            <a:r>
+              <a:rPr lang="en-US" sz="2000" dirty="0"/>
+              <a:t>STDERR</a:t>
+            </a:r>
+            <a:endParaRPr lang="en-US" sz="1200" dirty="0">
+              <a:latin typeface="Consolas" panose="020B0609020204030204" pitchFamily="49" charset="0"/>
+            </a:endParaRPr>
+          </a:p>
+        </p:txBody>
+      </p:sp>
+      <p:cxnSp>
+        <p:nvCxnSpPr>
+          <p:cNvPr id="28" name="Straight Arrow Connector 27">
+            <a:extLst>
+              <a:ext uri="{FF2B5EF4-FFF2-40B4-BE49-F238E27FC236}">
+                <a16:creationId xmlns:a16="http://schemas.microsoft.com/office/drawing/2014/main" id="{5EF2CFC3-06A5-BD51-0C2E-E06527EF1BEA}"/>
+              </a:ext>
+            </a:extLst>
+          </p:cNvPr>
+          <p:cNvCxnSpPr>
+            <a:cxnSpLocks/>
+          </p:cNvCxnSpPr>
+          <p:nvPr/>
+        </p:nvCxnSpPr>
+        <p:spPr>
+          <a:xfrm>
+            <a:off x="4189607" y="2876869"/>
+            <a:ext cx="0" cy="595492"/>
+          </a:xfrm>
+          <a:prstGeom prst="straightConnector1">
+            <a:avLst/>
+          </a:prstGeom>
+          <a:ln w="76200">
+            <a:solidFill>
+              <a:srgbClr val="002B49"/>
+            </a:solidFill>
+            <a:tailEnd type="triangle"/>
+          </a:ln>
+        </p:spPr>
+        <p:style>
+          <a:lnRef idx="1">
+            <a:schemeClr val="accent1"/>
+          </a:lnRef>
+          <a:fillRef idx="0">
+            <a:schemeClr val="accent1"/>
+          </a:fillRef>
+          <a:effectRef idx="0">
+            <a:schemeClr val="accent1"/>
+          </a:effectRef>
+          <a:fontRef idx="minor">
+            <a:schemeClr val="tx1"/>
+          </a:fontRef>
+        </p:style>
+      </p:cxnSp>
+      <p:cxnSp>
+        <p:nvCxnSpPr>
+          <p:cNvPr id="29" name="Straight Arrow Connector 28">
+            <a:extLst>
+              <a:ext uri="{FF2B5EF4-FFF2-40B4-BE49-F238E27FC236}">
+                <a16:creationId xmlns:a16="http://schemas.microsoft.com/office/drawing/2014/main" id="{F67F1AC5-23CA-B40E-7D84-CC98405371FE}"/>
+              </a:ext>
+            </a:extLst>
+          </p:cNvPr>
+          <p:cNvCxnSpPr>
+            <a:cxnSpLocks/>
+          </p:cNvCxnSpPr>
+          <p:nvPr/>
+        </p:nvCxnSpPr>
+        <p:spPr>
+          <a:xfrm>
+            <a:off x="3054628" y="2874510"/>
+            <a:ext cx="0" cy="595492"/>
+          </a:xfrm>
+          <a:prstGeom prst="straightConnector1">
+            <a:avLst/>
+          </a:prstGeom>
+          <a:ln w="76200">
+            <a:solidFill>
+              <a:srgbClr val="002B49"/>
+            </a:solidFill>
+            <a:tailEnd type="triangle"/>
+          </a:ln>
+        </p:spPr>
+        <p:style>
+          <a:lnRef idx="1">
+            <a:schemeClr val="accent1"/>
+          </a:lnRef>
+          <a:fillRef idx="0">
+            <a:schemeClr val="accent1"/>
+          </a:fillRef>
+          <a:effectRef idx="0">
+            <a:schemeClr val="accent1"/>
+          </a:effectRef>
+          <a:fontRef idx="minor">
+            <a:schemeClr val="tx1"/>
+          </a:fontRef>
+        </p:style>
+      </p:cxnSp>
     </p:spTree>
     <p:extLst>
       <p:ext uri="{BB962C8B-B14F-4D97-AF65-F5344CB8AC3E}">
@@ -4473,7 +4720,7 @@
         <p:spPr>
           <a:xfrm>
             <a:off x="363273" y="3040185"/>
-            <a:ext cx="5732726" cy="3392962"/>
+            <a:ext cx="5732726" cy="3087565"/>
           </a:xfrm>
           <a:prstGeom prst="rect">
             <a:avLst/>
@@ -4585,7 +4832,7 @@
         <p:spPr>
           <a:xfrm>
             <a:off x="1091229" y="556557"/>
-            <a:ext cx="2903517" cy="900000"/>
+            <a:ext cx="3443756" cy="900000"/>
           </a:xfrm>
           <a:prstGeom prst="rect">
             <a:avLst/>
@@ -4653,7 +4900,7 @@
         <p:spPr>
           <a:xfrm>
             <a:off x="1091230" y="1785282"/>
-            <a:ext cx="2903516" cy="900000"/>
+            <a:ext cx="3443756" cy="900000"/>
           </a:xfrm>
           <a:prstGeom prst="rect">
             <a:avLst/>
@@ -4711,8 +4958,8 @@
         </p:nvCxnSpPr>
         <p:spPr>
           <a:xfrm>
-            <a:off x="2542988" y="1456557"/>
-            <a:ext cx="0" cy="328725"/>
+            <a:off x="2813107" y="1456557"/>
+            <a:ext cx="1" cy="328725"/>
           </a:xfrm>
           <a:prstGeom prst="straightConnector1">
             <a:avLst/>
@@ -4757,8 +5004,8 @@
         </p:nvCxnSpPr>
         <p:spPr>
           <a:xfrm flipH="1">
-            <a:off x="2541941" y="2685282"/>
-            <a:ext cx="1047" cy="552130"/>
+            <a:off x="2812317" y="2685282"/>
+            <a:ext cx="791" cy="552130"/>
           </a:xfrm>
           <a:prstGeom prst="straightConnector1">
             <a:avLst/>
@@ -4800,7 +5047,7 @@
         <p:spPr>
           <a:xfrm>
             <a:off x="1091229" y="3212948"/>
-            <a:ext cx="4846151" cy="3016152"/>
+            <a:ext cx="4846151" cy="2737002"/>
           </a:xfrm>
           <a:prstGeom prst="rect">
             <a:avLst/>
@@ -4839,10 +5086,10 @@
       </p:sp>
       <p:sp>
         <p:nvSpPr>
-          <p:cNvPr id="24" name="Rectangle 23">
-            <a:extLst>
-              <a:ext uri="{FF2B5EF4-FFF2-40B4-BE49-F238E27FC236}">
-                <a16:creationId xmlns:a16="http://schemas.microsoft.com/office/drawing/2014/main" id="{1CA2A669-77C3-9387-DB3B-2D8BE0E6734C}"/>
+          <p:cNvPr id="26" name="Diamond 25">
+            <a:extLst>
+              <a:ext uri="{FF2B5EF4-FFF2-40B4-BE49-F238E27FC236}">
+                <a16:creationId xmlns:a16="http://schemas.microsoft.com/office/drawing/2014/main" id="{4297B822-090C-34CA-C472-211BCA58A64D}"/>
               </a:ext>
             </a:extLst>
           </p:cNvPr>
@@ -4851,8 +5098,232 @@
         </p:nvSpPr>
         <p:spPr>
           <a:xfrm>
-            <a:off x="3830715" y="5134812"/>
-            <a:ext cx="1437353" cy="938725"/>
+            <a:off x="1728783" y="3237412"/>
+            <a:ext cx="2167067" cy="1381112"/>
+          </a:xfrm>
+          <a:prstGeom prst="diamond">
+            <a:avLst/>
+          </a:prstGeom>
+          <a:solidFill>
+            <a:schemeClr val="tx2"/>
+          </a:solidFill>
+          <a:ln>
+            <a:noFill/>
+          </a:ln>
+        </p:spPr>
+        <p:style>
+          <a:lnRef idx="2">
+            <a:schemeClr val="accent1">
+              <a:shade val="50000"/>
+            </a:schemeClr>
+          </a:lnRef>
+          <a:fillRef idx="1">
+            <a:schemeClr val="accent1"/>
+          </a:fillRef>
+          <a:effectRef idx="0">
+            <a:schemeClr val="accent1"/>
+          </a:effectRef>
+          <a:fontRef idx="minor">
+            <a:schemeClr val="lt1"/>
+          </a:fontRef>
+        </p:style>
+        <p:txBody>
+          <a:bodyPr rtlCol="0" anchor="ctr"/>
+          <a:lstStyle/>
+          <a:p>
+            <a:pPr algn="ctr"/>
+            <a:r>
+              <a:rPr lang="en-US" dirty="0"/>
+              <a:t>Standard stream ?</a:t>
+            </a:r>
+          </a:p>
+        </p:txBody>
+      </p:sp>
+      <p:cxnSp>
+        <p:nvCxnSpPr>
+          <p:cNvPr id="27" name="Straight Arrow Connector 26">
+            <a:extLst>
+              <a:ext uri="{FF2B5EF4-FFF2-40B4-BE49-F238E27FC236}">
+                <a16:creationId xmlns:a16="http://schemas.microsoft.com/office/drawing/2014/main" id="{43C8CF48-F0A9-6AF2-01DE-448F936D39D3}"/>
+              </a:ext>
+            </a:extLst>
+          </p:cNvPr>
+          <p:cNvCxnSpPr>
+            <a:cxnSpLocks/>
+            <a:stCxn id="26" idx="2"/>
+          </p:cNvCxnSpPr>
+          <p:nvPr/>
+        </p:nvCxnSpPr>
+        <p:spPr>
+          <a:xfrm>
+            <a:off x="2812317" y="4618524"/>
+            <a:ext cx="791" cy="516289"/>
+          </a:xfrm>
+          <a:prstGeom prst="straightConnector1">
+            <a:avLst/>
+          </a:prstGeom>
+          <a:ln w="76200">
+            <a:solidFill>
+              <a:schemeClr val="tx2"/>
+            </a:solidFill>
+            <a:tailEnd type="triangle"/>
+          </a:ln>
+        </p:spPr>
+        <p:style>
+          <a:lnRef idx="1">
+            <a:schemeClr val="accent1"/>
+          </a:lnRef>
+          <a:fillRef idx="0">
+            <a:schemeClr val="accent1"/>
+          </a:fillRef>
+          <a:effectRef idx="0">
+            <a:schemeClr val="accent1"/>
+          </a:effectRef>
+          <a:fontRef idx="minor">
+            <a:schemeClr val="tx1"/>
+          </a:fontRef>
+        </p:style>
+      </p:cxnSp>
+      <p:cxnSp>
+        <p:nvCxnSpPr>
+          <p:cNvPr id="28" name="Connector: Elbow 27">
+            <a:extLst>
+              <a:ext uri="{FF2B5EF4-FFF2-40B4-BE49-F238E27FC236}">
+                <a16:creationId xmlns:a16="http://schemas.microsoft.com/office/drawing/2014/main" id="{DEE2ABEA-D559-3DC2-A34F-BFD4C0342DA6}"/>
+              </a:ext>
+            </a:extLst>
+          </p:cNvPr>
+          <p:cNvCxnSpPr>
+            <a:cxnSpLocks/>
+            <a:stCxn id="26" idx="3"/>
+            <a:endCxn id="46" idx="0"/>
+          </p:cNvCxnSpPr>
+          <p:nvPr/>
+        </p:nvCxnSpPr>
+        <p:spPr>
+          <a:xfrm>
+            <a:off x="3895850" y="3927968"/>
+            <a:ext cx="1093092" cy="1206845"/>
+          </a:xfrm>
+          <a:prstGeom prst="bentConnector2">
+            <a:avLst/>
+          </a:prstGeom>
+          <a:ln w="76200">
+            <a:solidFill>
+              <a:schemeClr val="tx2"/>
+            </a:solidFill>
+            <a:tailEnd type="triangle"/>
+          </a:ln>
+        </p:spPr>
+        <p:style>
+          <a:lnRef idx="1">
+            <a:schemeClr val="accent1"/>
+          </a:lnRef>
+          <a:fillRef idx="0">
+            <a:schemeClr val="accent1"/>
+          </a:fillRef>
+          <a:effectRef idx="0">
+            <a:schemeClr val="accent1"/>
+          </a:effectRef>
+          <a:fontRef idx="minor">
+            <a:schemeClr val="tx1"/>
+          </a:fontRef>
+        </p:style>
+      </p:cxnSp>
+      <p:sp>
+        <p:nvSpPr>
+          <p:cNvPr id="29" name="TextBox 28">
+            <a:extLst>
+              <a:ext uri="{FF2B5EF4-FFF2-40B4-BE49-F238E27FC236}">
+                <a16:creationId xmlns:a16="http://schemas.microsoft.com/office/drawing/2014/main" id="{78E7C250-8779-610F-2B56-2FEC7391FF0B}"/>
+              </a:ext>
+            </a:extLst>
+          </p:cNvPr>
+          <p:cNvSpPr txBox="1"/>
+          <p:nvPr/>
+        </p:nvSpPr>
+        <p:spPr>
+          <a:xfrm>
+            <a:off x="2825244" y="4594150"/>
+            <a:ext cx="550507" cy="369332"/>
+          </a:xfrm>
+          <a:prstGeom prst="rect">
+            <a:avLst/>
+          </a:prstGeom>
+          <a:noFill/>
+        </p:spPr>
+        <p:txBody>
+          <a:bodyPr wrap="square" rtlCol="0">
+            <a:spAutoFit/>
+          </a:bodyPr>
+          <a:lstStyle/>
+          <a:p>
+            <a:r>
+              <a:rPr lang="en-US" dirty="0">
+                <a:solidFill>
+                  <a:schemeClr val="bg1"/>
+                </a:solidFill>
+              </a:rPr>
+              <a:t>Yes</a:t>
+            </a:r>
+          </a:p>
+        </p:txBody>
+      </p:sp>
+      <p:sp>
+        <p:nvSpPr>
+          <p:cNvPr id="30" name="TextBox 29">
+            <a:extLst>
+              <a:ext uri="{FF2B5EF4-FFF2-40B4-BE49-F238E27FC236}">
+                <a16:creationId xmlns:a16="http://schemas.microsoft.com/office/drawing/2014/main" id="{D0650F85-FD94-7FC8-3AA0-B287689DAFF6}"/>
+              </a:ext>
+            </a:extLst>
+          </p:cNvPr>
+          <p:cNvSpPr txBox="1"/>
+          <p:nvPr/>
+        </p:nvSpPr>
+        <p:spPr>
+          <a:xfrm>
+            <a:off x="3808377" y="3558636"/>
+            <a:ext cx="550507" cy="369332"/>
+          </a:xfrm>
+          <a:prstGeom prst="rect">
+            <a:avLst/>
+          </a:prstGeom>
+          <a:noFill/>
+        </p:spPr>
+        <p:txBody>
+          <a:bodyPr wrap="square" rtlCol="0">
+            <a:spAutoFit/>
+          </a:bodyPr>
+          <a:lstStyle/>
+          <a:p>
+            <a:r>
+              <a:rPr lang="en-US" dirty="0">
+                <a:solidFill>
+                  <a:schemeClr val="bg1"/>
+                </a:solidFill>
+              </a:rPr>
+              <a:t>No</a:t>
+            </a:r>
+          </a:p>
+        </p:txBody>
+      </p:sp>
+      <p:sp>
+        <p:nvSpPr>
+          <p:cNvPr id="43" name="Rectangle 42">
+            <a:extLst>
+              <a:ext uri="{FF2B5EF4-FFF2-40B4-BE49-F238E27FC236}">
+                <a16:creationId xmlns:a16="http://schemas.microsoft.com/office/drawing/2014/main" id="{EF836BB0-C720-E803-21E7-B9131B2FE27B}"/>
+              </a:ext>
+            </a:extLst>
+          </p:cNvPr>
+          <p:cNvSpPr/>
+          <p:nvPr/>
+        </p:nvSpPr>
+        <p:spPr>
+          <a:xfrm>
+            <a:off x="1254123" y="5134813"/>
+            <a:ext cx="3101602" cy="631485"/>
           </a:xfrm>
           <a:prstGeom prst="rect">
             <a:avLst/>
@@ -4885,20 +5356,272 @@
           <a:lstStyle/>
           <a:p>
             <a:pPr algn="ctr"/>
-            <a:r>
-              <a:rPr lang="en-US" sz="2000" dirty="0"/>
-              <a:t>I/O</a:t>
-            </a:r>
-            <a:br>
-              <a:rPr lang="en-US" sz="2000" dirty="0"/>
-            </a:br>
-            <a:r>
-              <a:rPr lang="en-US" sz="1200" dirty="0">
-                <a:latin typeface="Consolas" panose="020B0609020204030204" pitchFamily="49" charset="0"/>
+            <a:endParaRPr lang="en-US" sz="2000" dirty="0"/>
+          </a:p>
+        </p:txBody>
+      </p:sp>
+      <p:sp>
+        <p:nvSpPr>
+          <p:cNvPr id="7" name="Rectangle 6">
+            <a:extLst>
+              <a:ext uri="{FF2B5EF4-FFF2-40B4-BE49-F238E27FC236}">
+                <a16:creationId xmlns:a16="http://schemas.microsoft.com/office/drawing/2014/main" id="{30B5CAA7-7C21-FAE5-68A5-202189CB87DB}"/>
+              </a:ext>
+            </a:extLst>
+          </p:cNvPr>
+          <p:cNvSpPr/>
+          <p:nvPr/>
+        </p:nvSpPr>
+        <p:spPr>
+          <a:xfrm>
+            <a:off x="3336082" y="5203328"/>
+            <a:ext cx="952074" cy="502146"/>
+          </a:xfrm>
+          <a:prstGeom prst="rect">
+            <a:avLst/>
+          </a:prstGeom>
+          <a:solidFill>
+            <a:schemeClr val="accent1"/>
+          </a:solidFill>
+          <a:ln>
+            <a:noFill/>
+          </a:ln>
+        </p:spPr>
+        <p:style>
+          <a:lnRef idx="2">
+            <a:schemeClr val="accent1">
+              <a:shade val="50000"/>
+            </a:schemeClr>
+          </a:lnRef>
+          <a:fillRef idx="1">
+            <a:schemeClr val="accent1"/>
+          </a:fillRef>
+          <a:effectRef idx="0">
+            <a:schemeClr val="accent1"/>
+          </a:effectRef>
+          <a:fontRef idx="minor">
+            <a:schemeClr val="lt1"/>
+          </a:fontRef>
+        </p:style>
+        <p:txBody>
+          <a:bodyPr rtlCol="0" anchor="ctr"/>
+          <a:lstStyle/>
+          <a:p>
+            <a:pPr marL="0" marR="0" lvl="0" indent="0" algn="ctr" defTabSz="914400" rtl="0" eaLnBrk="1" fontAlgn="auto" latinLnBrk="0" hangingPunct="1">
+              <a:lnSpc>
+                <a:spcPct val="100000"/>
+              </a:lnSpc>
+              <a:spcBef>
+                <a:spcPts val="0"/>
+              </a:spcBef>
+              <a:spcAft>
+                <a:spcPts val="0"/>
+              </a:spcAft>
+              <a:buClrTx/>
+              <a:buSzTx/>
+              <a:buFontTx/>
+              <a:buNone/>
+              <a:tabLst/>
+              <a:defRPr/>
+            </a:pPr>
+            <a:r>
+              <a:rPr kumimoji="0" lang="en-US" b="0" i="0" u="none" strike="noStrike" kern="1200" cap="none" spc="0" normalizeH="0" baseline="0" noProof="0" dirty="0">
+                <a:ln>
+                  <a:noFill/>
+                </a:ln>
+                <a:solidFill>
+                  <a:prstClr val="white"/>
+                </a:solidFill>
+                <a:effectLst/>
+                <a:uLnTx/>
+                <a:uFillTx/>
+                <a:latin typeface="Calibri" panose="020F0502020204030204"/>
+                <a:ea typeface="+mn-ea"/>
+                <a:cs typeface="+mn-cs"/>
               </a:rPr>
-              <a:t>File</a:t>
-            </a:r>
-            <a:endParaRPr lang="en-US" sz="1050" dirty="0">
+              <a:t>STDERR</a:t>
+            </a:r>
+            <a:endParaRPr kumimoji="0" lang="en-US" sz="1200" b="0" i="0" u="none" strike="noStrike" kern="1200" cap="none" spc="0" normalizeH="0" baseline="0" noProof="0" dirty="0">
+              <a:ln>
+                <a:noFill/>
+              </a:ln>
+              <a:solidFill>
+                <a:prstClr val="white"/>
+              </a:solidFill>
+              <a:effectLst/>
+              <a:uLnTx/>
+              <a:uFillTx/>
+              <a:latin typeface="Consolas" panose="020B0609020204030204" pitchFamily="49" charset="0"/>
+              <a:ea typeface="+mn-ea"/>
+              <a:cs typeface="+mn-cs"/>
+            </a:endParaRPr>
+          </a:p>
+        </p:txBody>
+      </p:sp>
+      <p:sp>
+        <p:nvSpPr>
+          <p:cNvPr id="5" name="Rectangle 4">
+            <a:extLst>
+              <a:ext uri="{FF2B5EF4-FFF2-40B4-BE49-F238E27FC236}">
+                <a16:creationId xmlns:a16="http://schemas.microsoft.com/office/drawing/2014/main" id="{0E43C8D7-649E-BA12-79E8-708FBDA82E31}"/>
+              </a:ext>
+            </a:extLst>
+          </p:cNvPr>
+          <p:cNvSpPr/>
+          <p:nvPr/>
+        </p:nvSpPr>
+        <p:spPr>
+          <a:xfrm>
+            <a:off x="2330875" y="5204001"/>
+            <a:ext cx="952073" cy="501473"/>
+          </a:xfrm>
+          <a:prstGeom prst="rect">
+            <a:avLst/>
+          </a:prstGeom>
+          <a:solidFill>
+            <a:schemeClr val="accent1"/>
+          </a:solidFill>
+          <a:ln>
+            <a:noFill/>
+          </a:ln>
+        </p:spPr>
+        <p:style>
+          <a:lnRef idx="2">
+            <a:schemeClr val="accent1">
+              <a:shade val="50000"/>
+            </a:schemeClr>
+          </a:lnRef>
+          <a:fillRef idx="1">
+            <a:schemeClr val="accent1"/>
+          </a:fillRef>
+          <a:effectRef idx="0">
+            <a:schemeClr val="accent1"/>
+          </a:effectRef>
+          <a:fontRef idx="minor">
+            <a:schemeClr val="lt1"/>
+          </a:fontRef>
+        </p:style>
+        <p:txBody>
+          <a:bodyPr rtlCol="0" anchor="ctr"/>
+          <a:lstStyle/>
+          <a:p>
+            <a:pPr marL="0" marR="0" lvl="0" indent="0" algn="ctr" defTabSz="914400" rtl="0" eaLnBrk="1" fontAlgn="auto" latinLnBrk="0" hangingPunct="1">
+              <a:lnSpc>
+                <a:spcPct val="100000"/>
+              </a:lnSpc>
+              <a:spcBef>
+                <a:spcPts val="0"/>
+              </a:spcBef>
+              <a:spcAft>
+                <a:spcPts val="0"/>
+              </a:spcAft>
+              <a:buClrTx/>
+              <a:buSzTx/>
+              <a:buFontTx/>
+              <a:buNone/>
+              <a:tabLst/>
+              <a:defRPr/>
+            </a:pPr>
+            <a:r>
+              <a:rPr kumimoji="0" lang="en-US" b="0" i="0" u="none" strike="noStrike" kern="1200" cap="none" spc="0" normalizeH="0" baseline="0" noProof="0" dirty="0">
+                <a:ln>
+                  <a:noFill/>
+                </a:ln>
+                <a:solidFill>
+                  <a:prstClr val="white"/>
+                </a:solidFill>
+                <a:effectLst/>
+                <a:uLnTx/>
+                <a:uFillTx/>
+                <a:latin typeface="Calibri" panose="020F0502020204030204"/>
+                <a:ea typeface="+mn-ea"/>
+                <a:cs typeface="+mn-cs"/>
+              </a:rPr>
+              <a:t>STDOUT</a:t>
+            </a:r>
+            <a:endParaRPr kumimoji="0" lang="en-US" sz="1200" b="0" i="0" u="none" strike="noStrike" kern="1200" cap="none" spc="0" normalizeH="0" baseline="0" noProof="0" dirty="0">
+              <a:ln>
+                <a:noFill/>
+              </a:ln>
+              <a:solidFill>
+                <a:prstClr val="white"/>
+              </a:solidFill>
+              <a:effectLst/>
+              <a:uLnTx/>
+              <a:uFillTx/>
+              <a:latin typeface="Consolas" panose="020B0609020204030204" pitchFamily="49" charset="0"/>
+              <a:ea typeface="+mn-ea"/>
+              <a:cs typeface="+mn-cs"/>
+            </a:endParaRPr>
+          </a:p>
+        </p:txBody>
+      </p:sp>
+      <p:sp>
+        <p:nvSpPr>
+          <p:cNvPr id="4" name="Rectangle 3">
+            <a:extLst>
+              <a:ext uri="{FF2B5EF4-FFF2-40B4-BE49-F238E27FC236}">
+                <a16:creationId xmlns:a16="http://schemas.microsoft.com/office/drawing/2014/main" id="{FC698D39-78A3-E823-1C5B-20B502182FD2}"/>
+              </a:ext>
+            </a:extLst>
+          </p:cNvPr>
+          <p:cNvSpPr/>
+          <p:nvPr/>
+        </p:nvSpPr>
+        <p:spPr>
+          <a:xfrm>
+            <a:off x="1321689" y="5203328"/>
+            <a:ext cx="952072" cy="501474"/>
+          </a:xfrm>
+          <a:prstGeom prst="rect">
+            <a:avLst/>
+          </a:prstGeom>
+          <a:solidFill>
+            <a:schemeClr val="accent1"/>
+          </a:solidFill>
+          <a:ln>
+            <a:noFill/>
+          </a:ln>
+        </p:spPr>
+        <p:style>
+          <a:lnRef idx="2">
+            <a:schemeClr val="accent1">
+              <a:shade val="50000"/>
+            </a:schemeClr>
+          </a:lnRef>
+          <a:fillRef idx="1">
+            <a:schemeClr val="accent1"/>
+          </a:fillRef>
+          <a:effectRef idx="0">
+            <a:schemeClr val="accent1"/>
+          </a:effectRef>
+          <a:fontRef idx="minor">
+            <a:schemeClr val="lt1"/>
+          </a:fontRef>
+        </p:style>
+        <p:txBody>
+          <a:bodyPr rtlCol="0" anchor="ctr"/>
+          <a:lstStyle/>
+          <a:p>
+            <a:pPr algn="ctr"/>
+            <a:r>
+              <a:rPr kumimoji="0" lang="en-US" b="0" i="0" u="none" strike="noStrike" kern="1200" cap="none" spc="0" normalizeH="0" baseline="0" noProof="0" dirty="0">
+                <a:ln>
+                  <a:noFill/>
+                </a:ln>
+                <a:solidFill>
+                  <a:prstClr val="white"/>
+                </a:solidFill>
+                <a:effectLst/>
+                <a:uLnTx/>
+                <a:uFillTx/>
+                <a:latin typeface="Calibri" panose="020F0502020204030204"/>
+                <a:ea typeface="+mn-ea"/>
+                <a:cs typeface="+mn-cs"/>
+              </a:rPr>
+              <a:t>STDIN</a:t>
+            </a:r>
+            <a:endParaRPr lang="en-US" sz="1100" dirty="0">
               <a:latin typeface="Consolas" panose="020B0609020204030204" pitchFamily="49" charset="0"/>
             </a:endParaRPr>
           </a:p>
@@ -4906,10 +5629,10 @@
       </p:sp>
       <p:sp>
         <p:nvSpPr>
-          <p:cNvPr id="25" name="Rectangle 24">
-            <a:extLst>
-              <a:ext uri="{FF2B5EF4-FFF2-40B4-BE49-F238E27FC236}">
-                <a16:creationId xmlns:a16="http://schemas.microsoft.com/office/drawing/2014/main" id="{E27AEF1B-7539-1FC3-EF5A-904AE62F891B}"/>
+          <p:cNvPr id="46" name="Rectangle 45">
+            <a:extLst>
+              <a:ext uri="{FF2B5EF4-FFF2-40B4-BE49-F238E27FC236}">
+                <a16:creationId xmlns:a16="http://schemas.microsoft.com/office/drawing/2014/main" id="{21019A7F-07D9-DDBA-02C6-6183DDC3CC78}"/>
               </a:ext>
             </a:extLst>
           </p:cNvPr>
@@ -4918,8 +5641,8 @@
         </p:nvSpPr>
         <p:spPr>
           <a:xfrm>
-            <a:off x="1734220" y="5135502"/>
-            <a:ext cx="1615439" cy="938725"/>
+            <a:off x="4474052" y="5134813"/>
+            <a:ext cx="1029779" cy="631485"/>
           </a:xfrm>
           <a:prstGeom prst="rect">
             <a:avLst/>
@@ -4952,31 +5675,16 @@
           <a:lstStyle/>
           <a:p>
             <a:pPr algn="ctr"/>
-            <a:r>
-              <a:rPr lang="en-US" sz="2000" dirty="0"/>
-              <a:t>I/O</a:t>
-            </a:r>
-            <a:br>
-              <a:rPr lang="en-US" sz="2000" dirty="0"/>
-            </a:br>
-            <a:r>
-              <a:rPr lang="en-US" sz="1050" dirty="0">
-                <a:latin typeface="Consolas" panose="020B0609020204030204" pitchFamily="49" charset="0"/>
-              </a:rPr>
-              <a:t>STDERR,STDIN,STDOUT</a:t>
-            </a:r>
-            <a:endParaRPr lang="en-US" sz="1200" dirty="0">
-              <a:latin typeface="Consolas" panose="020B0609020204030204" pitchFamily="49" charset="0"/>
-            </a:endParaRPr>
-          </a:p>
-        </p:txBody>
-      </p:sp>
-      <p:sp>
-        <p:nvSpPr>
-          <p:cNvPr id="26" name="Diamond 25">
-            <a:extLst>
-              <a:ext uri="{FF2B5EF4-FFF2-40B4-BE49-F238E27FC236}">
-                <a16:creationId xmlns:a16="http://schemas.microsoft.com/office/drawing/2014/main" id="{4297B822-090C-34CA-C472-211BCA58A64D}"/>
+            <a:endParaRPr lang="en-US" sz="2000" dirty="0"/>
+          </a:p>
+        </p:txBody>
+      </p:sp>
+      <p:sp>
+        <p:nvSpPr>
+          <p:cNvPr id="24" name="Rectangle 23">
+            <a:extLst>
+              <a:ext uri="{FF2B5EF4-FFF2-40B4-BE49-F238E27FC236}">
+                <a16:creationId xmlns:a16="http://schemas.microsoft.com/office/drawing/2014/main" id="{1CA2A669-77C3-9387-DB3B-2D8BE0E6734C}"/>
               </a:ext>
             </a:extLst>
           </p:cNvPr>
@@ -4985,14 +5693,14 @@
         </p:nvSpPr>
         <p:spPr>
           <a:xfrm>
-            <a:off x="1458407" y="3237412"/>
-            <a:ext cx="2167067" cy="1381112"/>
-          </a:xfrm>
-          <a:prstGeom prst="diamond">
+            <a:off x="4534986" y="5203328"/>
+            <a:ext cx="897491" cy="501475"/>
+          </a:xfrm>
+          <a:prstGeom prst="rect">
             <a:avLst/>
           </a:prstGeom>
           <a:solidFill>
-            <a:schemeClr val="tx2"/>
+            <a:schemeClr val="accent1"/>
           </a:solidFill>
           <a:ln>
             <a:noFill/>
@@ -5015,183 +5723,25 @@
           </a:fontRef>
         </p:style>
         <p:txBody>
-          <a:bodyPr rtlCol="0" anchor="ctr"/>
+          <a:bodyPr rtlCol="0" anchor="ctr">
+            <a:normAutofit fontScale="85000" lnSpcReduction="20000"/>
+          </a:bodyPr>
           <a:lstStyle/>
           <a:p>
             <a:pPr algn="ctr"/>
             <a:r>
               <a:rPr lang="en-US" dirty="0"/>
-              <a:t>Standard stream ?</a:t>
-            </a:r>
-          </a:p>
-        </p:txBody>
-      </p:sp>
-      <p:cxnSp>
-        <p:nvCxnSpPr>
-          <p:cNvPr id="27" name="Straight Arrow Connector 26">
-            <a:extLst>
-              <a:ext uri="{FF2B5EF4-FFF2-40B4-BE49-F238E27FC236}">
-                <a16:creationId xmlns:a16="http://schemas.microsoft.com/office/drawing/2014/main" id="{43C8CF48-F0A9-6AF2-01DE-448F936D39D3}"/>
-              </a:ext>
-            </a:extLst>
-          </p:cNvPr>
-          <p:cNvCxnSpPr>
-            <a:cxnSpLocks/>
-            <a:stCxn id="26" idx="2"/>
-            <a:endCxn id="25" idx="0"/>
-          </p:cNvCxnSpPr>
-          <p:nvPr/>
-        </p:nvCxnSpPr>
-        <p:spPr>
-          <a:xfrm flipH="1">
-            <a:off x="2541940" y="4618524"/>
-            <a:ext cx="1" cy="516978"/>
-          </a:xfrm>
-          <a:prstGeom prst="straightConnector1">
-            <a:avLst/>
-          </a:prstGeom>
-          <a:ln w="76200">
-            <a:solidFill>
-              <a:schemeClr val="tx2"/>
-            </a:solidFill>
-            <a:tailEnd type="triangle"/>
-          </a:ln>
-        </p:spPr>
-        <p:style>
-          <a:lnRef idx="1">
-            <a:schemeClr val="accent1"/>
-          </a:lnRef>
-          <a:fillRef idx="0">
-            <a:schemeClr val="accent1"/>
-          </a:fillRef>
-          <a:effectRef idx="0">
-            <a:schemeClr val="accent1"/>
-          </a:effectRef>
-          <a:fontRef idx="minor">
-            <a:schemeClr val="tx1"/>
-          </a:fontRef>
-        </p:style>
-      </p:cxnSp>
-      <p:cxnSp>
-        <p:nvCxnSpPr>
-          <p:cNvPr id="28" name="Connector: Elbow 27">
-            <a:extLst>
-              <a:ext uri="{FF2B5EF4-FFF2-40B4-BE49-F238E27FC236}">
-                <a16:creationId xmlns:a16="http://schemas.microsoft.com/office/drawing/2014/main" id="{DEE2ABEA-D559-3DC2-A34F-BFD4C0342DA6}"/>
-              </a:ext>
-            </a:extLst>
-          </p:cNvPr>
-          <p:cNvCxnSpPr>
-            <a:stCxn id="26" idx="3"/>
-            <a:endCxn id="24" idx="0"/>
-          </p:cNvCxnSpPr>
-          <p:nvPr/>
-        </p:nvCxnSpPr>
-        <p:spPr>
-          <a:xfrm>
-            <a:off x="3625474" y="3927968"/>
-            <a:ext cx="923918" cy="1206844"/>
-          </a:xfrm>
-          <a:prstGeom prst="bentConnector2">
-            <a:avLst/>
-          </a:prstGeom>
-          <a:ln w="76200">
-            <a:solidFill>
-              <a:schemeClr val="tx2"/>
-            </a:solidFill>
-            <a:tailEnd type="triangle"/>
-          </a:ln>
-        </p:spPr>
-        <p:style>
-          <a:lnRef idx="1">
-            <a:schemeClr val="accent1"/>
-          </a:lnRef>
-          <a:fillRef idx="0">
-            <a:schemeClr val="accent1"/>
-          </a:fillRef>
-          <a:effectRef idx="0">
-            <a:schemeClr val="accent1"/>
-          </a:effectRef>
-          <a:fontRef idx="minor">
-            <a:schemeClr val="tx1"/>
-          </a:fontRef>
-        </p:style>
-      </p:cxnSp>
-      <p:sp>
-        <p:nvSpPr>
-          <p:cNvPr id="29" name="TextBox 28">
-            <a:extLst>
-              <a:ext uri="{FF2B5EF4-FFF2-40B4-BE49-F238E27FC236}">
-                <a16:creationId xmlns:a16="http://schemas.microsoft.com/office/drawing/2014/main" id="{78E7C250-8779-610F-2B56-2FEC7391FF0B}"/>
-              </a:ext>
-            </a:extLst>
-          </p:cNvPr>
-          <p:cNvSpPr txBox="1"/>
-          <p:nvPr/>
-        </p:nvSpPr>
-        <p:spPr>
-          <a:xfrm>
-            <a:off x="2542502" y="4594150"/>
-            <a:ext cx="550507" cy="369332"/>
-          </a:xfrm>
-          <a:prstGeom prst="rect">
-            <a:avLst/>
-          </a:prstGeom>
-          <a:noFill/>
-        </p:spPr>
-        <p:txBody>
-          <a:bodyPr wrap="square" rtlCol="0">
-            <a:spAutoFit/>
-          </a:bodyPr>
-          <a:lstStyle/>
-          <a:p>
-            <a:r>
-              <a:rPr lang="en-US" dirty="0">
-                <a:solidFill>
-                  <a:schemeClr val="bg1"/>
-                </a:solidFill>
-              </a:rPr>
-              <a:t>Yes</a:t>
-            </a:r>
-          </a:p>
-        </p:txBody>
-      </p:sp>
-      <p:sp>
-        <p:nvSpPr>
-          <p:cNvPr id="30" name="TextBox 29">
-            <a:extLst>
-              <a:ext uri="{FF2B5EF4-FFF2-40B4-BE49-F238E27FC236}">
-                <a16:creationId xmlns:a16="http://schemas.microsoft.com/office/drawing/2014/main" id="{D0650F85-FD94-7FC8-3AA0-B287689DAFF6}"/>
-              </a:ext>
-            </a:extLst>
-          </p:cNvPr>
-          <p:cNvSpPr txBox="1"/>
-          <p:nvPr/>
-        </p:nvSpPr>
-        <p:spPr>
-          <a:xfrm>
-            <a:off x="3525635" y="3558636"/>
-            <a:ext cx="550507" cy="369332"/>
-          </a:xfrm>
-          <a:prstGeom prst="rect">
-            <a:avLst/>
-          </a:prstGeom>
-          <a:noFill/>
-        </p:spPr>
-        <p:txBody>
-          <a:bodyPr wrap="square" rtlCol="0">
-            <a:spAutoFit/>
-          </a:bodyPr>
-          <a:lstStyle/>
-          <a:p>
-            <a:r>
-              <a:rPr lang="en-US" dirty="0">
-                <a:solidFill>
-                  <a:schemeClr val="bg1"/>
-                </a:solidFill>
-              </a:rPr>
-              <a:t>No</a:t>
-            </a:r>
+              <a:t>File</a:t>
+            </a:r>
+            <a:r>
+              <a:rPr lang="en-US" sz="2000" dirty="0"/>
+              <a:t> </a:t>
+            </a:r>
+            <a:r>
+              <a:rPr lang="en-US" dirty="0"/>
+              <a:t>Interface</a:t>
+            </a:r>
+            <a:endParaRPr lang="en-US" sz="2000" dirty="0"/>
           </a:p>
         </p:txBody>
       </p:sp>
@@ -5325,7 +5875,9 @@
           </a:fontRef>
         </p:style>
         <p:txBody>
-          <a:bodyPr rtlCol="0" anchor="ctr"/>
+          <a:bodyPr rtlCol="0" anchor="ctr">
+            <a:noAutofit/>
+          </a:bodyPr>
           <a:lstStyle/>
           <a:p>
             <a:pPr marL="0" marR="0" lvl="0" indent="0" algn="ctr" defTabSz="914400" rtl="0" eaLnBrk="1" fontAlgn="auto" latinLnBrk="0" hangingPunct="1">
@@ -5346,40 +5898,7 @@
               <a:defRPr/>
             </a:pPr>
             <a:r>
-              <a:rPr kumimoji="0" lang="en-US" sz="2000" b="0" i="0" u="none" strike="noStrike" kern="1200" cap="none" spc="0" normalizeH="0" baseline="0" noProof="0" dirty="0">
-                <a:ln>
-                  <a:noFill/>
-                </a:ln>
-                <a:solidFill>
-                  <a:prstClr val="white"/>
-                </a:solidFill>
-                <a:effectLst/>
-                <a:uLnTx/>
-                <a:uFillTx/>
-                <a:latin typeface="Calibri" panose="020F0502020204030204"/>
-                <a:ea typeface="+mn-ea"/>
-                <a:cs typeface="+mn-cs"/>
-              </a:rPr>
-              <a:t>I/O</a:t>
-            </a:r>
-            <a:br>
-              <a:rPr kumimoji="0" lang="en-US" sz="2000" b="0" i="0" u="none" strike="noStrike" kern="1200" cap="none" spc="0" normalizeH="0" baseline="0" noProof="0" dirty="0">
-                <a:ln>
-                  <a:noFill/>
-                </a:ln>
-                <a:solidFill>
-                  <a:prstClr val="white"/>
-                </a:solidFill>
-                <a:effectLst/>
-                <a:uLnTx/>
-                <a:uFillTx/>
-                <a:latin typeface="Calibri" panose="020F0502020204030204"/>
-                <a:ea typeface="+mn-ea"/>
-                <a:cs typeface="+mn-cs"/>
-              </a:rPr>
-            </a:br>
-            <a:r>
-              <a:rPr kumimoji="0" lang="en-US" sz="1050" b="0" i="0" u="none" strike="noStrike" kern="1200" cap="none" spc="0" normalizeH="0" baseline="0" noProof="0" dirty="0">
+              <a:rPr kumimoji="0" lang="en-US" sz="1200" b="0" i="0" u="none" strike="noStrike" kern="1200" cap="none" spc="0" normalizeH="0" baseline="0" noProof="0" dirty="0">
                 <a:ln>
                   <a:noFill/>
                 </a:ln>
@@ -5395,7 +5914,7 @@
               </a:rPr>
               <a:t>STDERR,STDIN,STDOUT</a:t>
             </a:r>
-            <a:endParaRPr kumimoji="0" lang="en-US" sz="1200" b="0" i="0" u="none" strike="noStrike" kern="1200" cap="none" spc="0" normalizeH="0" baseline="0" noProof="0" dirty="0">
+            <a:endParaRPr kumimoji="0" lang="en-US" sz="1600" b="0" i="0" u="none" strike="noStrike" kern="1200" cap="none" spc="0" normalizeH="0" baseline="0" noProof="0" dirty="0">
               <a:ln>
                 <a:noFill/>
               </a:ln>
@@ -5619,7 +6138,7 @@
               <a:rPr lang="en-US" sz="1200" dirty="0">
                 <a:latin typeface="Consolas" panose="020B0609020204030204" pitchFamily="49" charset="0"/>
               </a:rPr>
-              <a:t>EVR</a:t>
+              <a:t>Event Recorder</a:t>
             </a:r>
           </a:p>
         </p:txBody>
@@ -5733,7 +6252,7 @@
               <a:rPr lang="en-US" sz="1200" dirty="0">
                 <a:latin typeface="Consolas" panose="020B0609020204030204" pitchFamily="49" charset="0"/>
               </a:rPr>
-              <a:t>User</a:t>
+              <a:t>Custom</a:t>
             </a:r>
           </a:p>
         </p:txBody>
@@ -5873,40 +6392,7 @@
                 <a:ea typeface="+mn-ea"/>
                 <a:cs typeface="+mn-cs"/>
               </a:rPr>
-              <a:t>I/O</a:t>
-            </a:r>
-            <a:br>
-              <a:rPr kumimoji="0" lang="en-US" sz="2000" b="0" i="0" u="none" strike="noStrike" kern="1200" cap="none" spc="0" normalizeH="0" baseline="0" noProof="0" dirty="0">
-                <a:ln>
-                  <a:noFill/>
-                </a:ln>
-                <a:solidFill>
-                  <a:prstClr val="white"/>
-                </a:solidFill>
-                <a:effectLst/>
-                <a:uLnTx/>
-                <a:uFillTx/>
-                <a:latin typeface="Calibri" panose="020F0502020204030204"/>
-                <a:ea typeface="+mn-ea"/>
-                <a:cs typeface="+mn-cs"/>
-              </a:rPr>
-            </a:br>
-            <a:r>
-              <a:rPr kumimoji="0" lang="en-US" sz="1050" b="0" i="0" u="none" strike="noStrike" kern="1200" cap="none" spc="0" normalizeH="0" baseline="0" noProof="0" dirty="0">
-                <a:ln>
-                  <a:noFill/>
-                </a:ln>
-                <a:solidFill>
-                  <a:prstClr val="white"/>
-                </a:solidFill>
-                <a:effectLst/>
-                <a:uLnTx/>
-                <a:uFillTx/>
-                <a:latin typeface="Consolas" panose="020B0609020204030204" pitchFamily="49" charset="0"/>
-                <a:ea typeface="+mn-ea"/>
-                <a:cs typeface="+mn-cs"/>
-              </a:rPr>
-              <a:t>File</a:t>
+              <a:t>File Interface</a:t>
             </a:r>
             <a:endParaRPr kumimoji="0" lang="en-US" sz="1200" b="0" i="0" u="none" strike="noStrike" kern="1200" cap="none" spc="0" normalizeH="0" baseline="0" noProof="0" dirty="0">
               <a:ln>
@@ -6132,7 +6618,7 @@
               <a:rPr lang="en-US" sz="1200" dirty="0">
                 <a:latin typeface="Consolas" panose="020B0609020204030204" pitchFamily="49" charset="0"/>
               </a:rPr>
-              <a:t>File Interface</a:t>
+              <a:t>Custom</a:t>
             </a:r>
           </a:p>
         </p:txBody>

</xml_diff>

<commit_message>
Add standard stream to CMSIS-Driver USART retarget implementation
</commit_message>
<xml_diff>
--- a/documentation/doxygen/src/images/blocks.pptx
+++ b/documentation/doxygen/src/images/blocks.pptx
@@ -273,7 +273,7 @@
           <a:p>
             <a:fld id="{E1BCA6AF-7F69-456D-BB79-EC94A44BF887}" type="datetimeFigureOut">
               <a:rPr lang="en-US" smtClean="0"/>
-              <a:t>11/10/2023</a:t>
+              <a:t>1/26/2026</a:t>
             </a:fld>
             <a:endParaRPr lang="en-US"/>
           </a:p>
@@ -471,7 +471,7 @@
           <a:p>
             <a:fld id="{E1BCA6AF-7F69-456D-BB79-EC94A44BF887}" type="datetimeFigureOut">
               <a:rPr lang="en-US" smtClean="0"/>
-              <a:t>11/10/2023</a:t>
+              <a:t>1/26/2026</a:t>
             </a:fld>
             <a:endParaRPr lang="en-US"/>
           </a:p>
@@ -679,7 +679,7 @@
           <a:p>
             <a:fld id="{E1BCA6AF-7F69-456D-BB79-EC94A44BF887}" type="datetimeFigureOut">
               <a:rPr lang="en-US" smtClean="0"/>
-              <a:t>11/10/2023</a:t>
+              <a:t>1/26/2026</a:t>
             </a:fld>
             <a:endParaRPr lang="en-US"/>
           </a:p>
@@ -877,7 +877,7 @@
           <a:p>
             <a:fld id="{E1BCA6AF-7F69-456D-BB79-EC94A44BF887}" type="datetimeFigureOut">
               <a:rPr lang="en-US" smtClean="0"/>
-              <a:t>11/10/2023</a:t>
+              <a:t>1/26/2026</a:t>
             </a:fld>
             <a:endParaRPr lang="en-US"/>
           </a:p>
@@ -1152,7 +1152,7 @@
           <a:p>
             <a:fld id="{E1BCA6AF-7F69-456D-BB79-EC94A44BF887}" type="datetimeFigureOut">
               <a:rPr lang="en-US" smtClean="0"/>
-              <a:t>11/10/2023</a:t>
+              <a:t>1/26/2026</a:t>
             </a:fld>
             <a:endParaRPr lang="en-US"/>
           </a:p>
@@ -1417,7 +1417,7 @@
           <a:p>
             <a:fld id="{E1BCA6AF-7F69-456D-BB79-EC94A44BF887}" type="datetimeFigureOut">
               <a:rPr lang="en-US" smtClean="0"/>
-              <a:t>11/10/2023</a:t>
+              <a:t>1/26/2026</a:t>
             </a:fld>
             <a:endParaRPr lang="en-US"/>
           </a:p>
@@ -1829,7 +1829,7 @@
           <a:p>
             <a:fld id="{E1BCA6AF-7F69-456D-BB79-EC94A44BF887}" type="datetimeFigureOut">
               <a:rPr lang="en-US" smtClean="0"/>
-              <a:t>11/10/2023</a:t>
+              <a:t>1/26/2026</a:t>
             </a:fld>
             <a:endParaRPr lang="en-US"/>
           </a:p>
@@ -1970,7 +1970,7 @@
           <a:p>
             <a:fld id="{E1BCA6AF-7F69-456D-BB79-EC94A44BF887}" type="datetimeFigureOut">
               <a:rPr lang="en-US" smtClean="0"/>
-              <a:t>11/10/2023</a:t>
+              <a:t>1/26/2026</a:t>
             </a:fld>
             <a:endParaRPr lang="en-US"/>
           </a:p>
@@ -2083,7 +2083,7 @@
           <a:p>
             <a:fld id="{E1BCA6AF-7F69-456D-BB79-EC94A44BF887}" type="datetimeFigureOut">
               <a:rPr lang="en-US" smtClean="0"/>
-              <a:t>11/10/2023</a:t>
+              <a:t>1/26/2026</a:t>
             </a:fld>
             <a:endParaRPr lang="en-US"/>
           </a:p>
@@ -2394,7 +2394,7 @@
           <a:p>
             <a:fld id="{E1BCA6AF-7F69-456D-BB79-EC94A44BF887}" type="datetimeFigureOut">
               <a:rPr lang="en-US" smtClean="0"/>
-              <a:t>11/10/2023</a:t>
+              <a:t>1/26/2026</a:t>
             </a:fld>
             <a:endParaRPr lang="en-US"/>
           </a:p>
@@ -2682,7 +2682,7 @@
           <a:p>
             <a:fld id="{E1BCA6AF-7F69-456D-BB79-EC94A44BF887}" type="datetimeFigureOut">
               <a:rPr lang="en-US" smtClean="0"/>
-              <a:t>11/10/2023</a:t>
+              <a:t>1/26/2026</a:t>
             </a:fld>
             <a:endParaRPr lang="en-US"/>
           </a:p>
@@ -2923,7 +2923,7 @@
           <a:p>
             <a:fld id="{E1BCA6AF-7F69-456D-BB79-EC94A44BF887}" type="datetimeFigureOut">
               <a:rPr lang="en-US" smtClean="0"/>
-              <a:t>11/10/2023</a:t>
+              <a:t>1/26/2026</a:t>
             </a:fld>
             <a:endParaRPr lang="en-US"/>
           </a:p>
@@ -5790,7 +5790,7 @@
         <p:spPr>
           <a:xfrm>
             <a:off x="363274" y="288277"/>
-            <a:ext cx="2945983" cy="3613163"/>
+            <a:ext cx="2945983" cy="4096687"/>
           </a:xfrm>
           <a:prstGeom prst="rect">
             <a:avLst/>
@@ -5992,7 +5992,7 @@
         <p:spPr>
           <a:xfrm>
             <a:off x="1004146" y="1491972"/>
-            <a:ext cx="1996554" cy="2206255"/>
+            <a:ext cx="1996554" cy="2699028"/>
           </a:xfrm>
           <a:prstGeom prst="rect">
             <a:avLst/>
@@ -6252,7 +6252,7 @@
               <a:rPr lang="en-US" sz="1200" dirty="0">
                 <a:latin typeface="Consolas" panose="020B0609020204030204" pitchFamily="49" charset="0"/>
               </a:rPr>
-              <a:t>Custom</a:t>
+              <a:t>UART</a:t>
             </a:r>
           </a:p>
         </p:txBody>
@@ -6581,6 +6581,63 @@
         <p:spPr>
           <a:xfrm>
             <a:off x="5875559" y="2171204"/>
+            <a:ext cx="1615439" cy="364464"/>
+          </a:xfrm>
+          <a:prstGeom prst="rect">
+            <a:avLst/>
+          </a:prstGeom>
+          <a:solidFill>
+            <a:schemeClr val="tx2"/>
+          </a:solidFill>
+          <a:ln>
+            <a:noFill/>
+          </a:ln>
+        </p:spPr>
+        <p:style>
+          <a:lnRef idx="2">
+            <a:schemeClr val="accent1">
+              <a:shade val="50000"/>
+            </a:schemeClr>
+          </a:lnRef>
+          <a:fillRef idx="1">
+            <a:schemeClr val="accent1"/>
+          </a:fillRef>
+          <a:effectRef idx="0">
+            <a:schemeClr val="accent1"/>
+          </a:effectRef>
+          <a:fontRef idx="minor">
+            <a:schemeClr val="lt1"/>
+          </a:fontRef>
+        </p:style>
+        <p:txBody>
+          <a:bodyPr rtlCol="0" anchor="ctr"/>
+          <a:lstStyle/>
+          <a:p>
+            <a:pPr algn="ctr"/>
+            <a:r>
+              <a:rPr lang="en-US" sz="1200" dirty="0">
+                <a:latin typeface="Consolas" panose="020B0609020204030204" pitchFamily="49" charset="0"/>
+              </a:rPr>
+              <a:t>Custom</a:t>
+            </a:r>
+          </a:p>
+        </p:txBody>
+      </p:sp>
+      <p:sp>
+        <p:nvSpPr>
+          <p:cNvPr id="6" name="Rectangle 5">
+            <a:extLst>
+              <a:ext uri="{FF2B5EF4-FFF2-40B4-BE49-F238E27FC236}">
+                <a16:creationId xmlns:a16="http://schemas.microsoft.com/office/drawing/2014/main" id="{F79AA737-33E0-0133-602E-E04576E87A5D}"/>
+              </a:ext>
+            </a:extLst>
+          </p:cNvPr>
+          <p:cNvSpPr/>
+          <p:nvPr/>
+        </p:nvSpPr>
+        <p:spPr>
+          <a:xfrm>
+            <a:off x="1194700" y="3645899"/>
             <a:ext cx="1615439" cy="364464"/>
           </a:xfrm>
           <a:prstGeom prst="rect">

</xml_diff>